<commit_message>
Update backend code and SAD
</commit_message>
<xml_diff>
--- a/Document/2_Software Architect Documentation/Software Architecture Documentation 1.0.pptx
+++ b/Document/2_Software Architect Documentation/Software Architecture Documentation 1.0.pptx
@@ -10,13 +10,13 @@
   <p:sldIdLst>
     <p:sldId id="256" r:id="rId2"/>
     <p:sldId id="257" r:id="rId3"/>
-    <p:sldId id="265" r:id="rId4"/>
-    <p:sldId id="260" r:id="rId5"/>
-    <p:sldId id="261" r:id="rId6"/>
-    <p:sldId id="262" r:id="rId7"/>
-    <p:sldId id="266" r:id="rId8"/>
-    <p:sldId id="263" r:id="rId9"/>
-    <p:sldId id="264" r:id="rId10"/>
+    <p:sldId id="269" r:id="rId4"/>
+    <p:sldId id="270" r:id="rId5"/>
+    <p:sldId id="262" r:id="rId6"/>
+    <p:sldId id="265" r:id="rId7"/>
+    <p:sldId id="267" r:id="rId8"/>
+    <p:sldId id="271" r:id="rId9"/>
+    <p:sldId id="272" r:id="rId10"/>
   </p:sldIdLst>
   <p:sldSz cx="9144000" cy="6858000" type="screen4x3"/>
   <p:notesSz cx="6858000" cy="9144000"/>
@@ -208,7 +208,7 @@
           <a:p>
             <a:fld id="{308A04E4-E20C-5D45-858C-98614247326D}" type="datetimeFigureOut">
               <a:rPr kumimoji="1" lang="ko-KR" altLang="en-US" smtClean="0"/>
-              <a:t>2019. 10. 29.</a:t>
+              <a:t>2019. 11. 2.</a:t>
             </a:fld>
             <a:endParaRPr kumimoji="1" lang="ko-KR" altLang="en-US"/>
           </a:p>
@@ -540,7 +540,7 @@
           <a:p>
             <a:fld id="{8715AA25-EEBE-B246-B1E2-0472C41AADB8}" type="slidenum">
               <a:rPr kumimoji="1" lang="ko-KR" altLang="en-US" smtClean="0"/>
-              <a:t>3</a:t>
+              <a:t>6</a:t>
             </a:fld>
             <a:endParaRPr kumimoji="1" lang="ko-KR" altLang="en-US"/>
           </a:p>
@@ -549,7 +549,7 @@
     </p:spTree>
     <p:extLst>
       <p:ext uri="{BB962C8B-B14F-4D97-AF65-F5344CB8AC3E}">
-        <p14:creationId xmlns:p14="http://schemas.microsoft.com/office/powerpoint/2010/main" val="2859369245"/>
+        <p14:creationId xmlns:p14="http://schemas.microsoft.com/office/powerpoint/2010/main" val="2935823237"/>
       </p:ext>
     </p:extLst>
   </p:cSld>
@@ -690,7 +690,7 @@
           <a:p>
             <a:fld id="{1F65A410-6AE3-7C40-B740-91E46FB0015F}" type="datetimeFigureOut">
               <a:rPr kumimoji="1" lang="ko-KR" altLang="en-US" smtClean="0"/>
-              <a:t>2019. 10. 29.</a:t>
+              <a:t>2019. 11. 2.</a:t>
             </a:fld>
             <a:endParaRPr kumimoji="1" lang="ko-KR" altLang="en-US"/>
           </a:p>
@@ -860,7 +860,7 @@
           <a:p>
             <a:fld id="{1F65A410-6AE3-7C40-B740-91E46FB0015F}" type="datetimeFigureOut">
               <a:rPr kumimoji="1" lang="ko-KR" altLang="en-US" smtClean="0"/>
-              <a:t>2019. 10. 29.</a:t>
+              <a:t>2019. 11. 2.</a:t>
             </a:fld>
             <a:endParaRPr kumimoji="1" lang="ko-KR" altLang="en-US"/>
           </a:p>
@@ -1040,7 +1040,7 @@
           <a:p>
             <a:fld id="{1F65A410-6AE3-7C40-B740-91E46FB0015F}" type="datetimeFigureOut">
               <a:rPr kumimoji="1" lang="ko-KR" altLang="en-US" smtClean="0"/>
-              <a:t>2019. 10. 29.</a:t>
+              <a:t>2019. 11. 2.</a:t>
             </a:fld>
             <a:endParaRPr kumimoji="1" lang="ko-KR" altLang="en-US"/>
           </a:p>
@@ -1215,7 +1215,7 @@
           <a:p>
             <a:fld id="{1F65A410-6AE3-7C40-B740-91E46FB0015F}" type="datetimeFigureOut">
               <a:rPr kumimoji="1" lang="ko-KR" altLang="en-US" smtClean="0"/>
-              <a:t>2019. 10. 29.</a:t>
+              <a:t>2019. 11. 2.</a:t>
             </a:fld>
             <a:endParaRPr kumimoji="1" lang="ko-KR" altLang="en-US"/>
           </a:p>
@@ -1459,7 +1459,7 @@
           <a:p>
             <a:fld id="{1F65A410-6AE3-7C40-B740-91E46FB0015F}" type="datetimeFigureOut">
               <a:rPr kumimoji="1" lang="ko-KR" altLang="en-US" smtClean="0"/>
-              <a:t>2019. 10. 29.</a:t>
+              <a:t>2019. 11. 2.</a:t>
             </a:fld>
             <a:endParaRPr kumimoji="1" lang="ko-KR" altLang="en-US"/>
           </a:p>
@@ -1691,7 +1691,7 @@
           <a:p>
             <a:fld id="{1F65A410-6AE3-7C40-B740-91E46FB0015F}" type="datetimeFigureOut">
               <a:rPr kumimoji="1" lang="ko-KR" altLang="en-US" smtClean="0"/>
-              <a:t>2019. 10. 29.</a:t>
+              <a:t>2019. 11. 2.</a:t>
             </a:fld>
             <a:endParaRPr kumimoji="1" lang="ko-KR" altLang="en-US"/>
           </a:p>
@@ -2058,7 +2058,7 @@
           <a:p>
             <a:fld id="{1F65A410-6AE3-7C40-B740-91E46FB0015F}" type="datetimeFigureOut">
               <a:rPr kumimoji="1" lang="ko-KR" altLang="en-US" smtClean="0"/>
-              <a:t>2019. 10. 29.</a:t>
+              <a:t>2019. 11. 2.</a:t>
             </a:fld>
             <a:endParaRPr kumimoji="1" lang="ko-KR" altLang="en-US"/>
           </a:p>
@@ -2176,7 +2176,7 @@
           <a:p>
             <a:fld id="{1F65A410-6AE3-7C40-B740-91E46FB0015F}" type="datetimeFigureOut">
               <a:rPr kumimoji="1" lang="ko-KR" altLang="en-US" smtClean="0"/>
-              <a:t>2019. 10. 29.</a:t>
+              <a:t>2019. 11. 2.</a:t>
             </a:fld>
             <a:endParaRPr kumimoji="1" lang="ko-KR" altLang="en-US"/>
           </a:p>
@@ -2271,7 +2271,7 @@
           <a:p>
             <a:fld id="{1F65A410-6AE3-7C40-B740-91E46FB0015F}" type="datetimeFigureOut">
               <a:rPr kumimoji="1" lang="ko-KR" altLang="en-US" smtClean="0"/>
-              <a:t>2019. 10. 29.</a:t>
+              <a:t>2019. 11. 2.</a:t>
             </a:fld>
             <a:endParaRPr kumimoji="1" lang="ko-KR" altLang="en-US"/>
           </a:p>
@@ -2548,7 +2548,7 @@
           <a:p>
             <a:fld id="{1F65A410-6AE3-7C40-B740-91E46FB0015F}" type="datetimeFigureOut">
               <a:rPr kumimoji="1" lang="ko-KR" altLang="en-US" smtClean="0"/>
-              <a:t>2019. 10. 29.</a:t>
+              <a:t>2019. 11. 2.</a:t>
             </a:fld>
             <a:endParaRPr kumimoji="1" lang="ko-KR" altLang="en-US"/>
           </a:p>
@@ -2805,7 +2805,7 @@
           <a:p>
             <a:fld id="{1F65A410-6AE3-7C40-B740-91E46FB0015F}" type="datetimeFigureOut">
               <a:rPr kumimoji="1" lang="ko-KR" altLang="en-US" smtClean="0"/>
-              <a:t>2019. 10. 29.</a:t>
+              <a:t>2019. 11. 2.</a:t>
             </a:fld>
             <a:endParaRPr kumimoji="1" lang="ko-KR" altLang="en-US"/>
           </a:p>
@@ -3018,7 +3018,7 @@
           <a:p>
             <a:fld id="{1F65A410-6AE3-7C40-B740-91E46FB0015F}" type="datetimeFigureOut">
               <a:rPr kumimoji="1" lang="ko-KR" altLang="en-US" smtClean="0"/>
-              <a:t>2019. 10. 29.</a:t>
+              <a:t>2019. 11. 2.</a:t>
             </a:fld>
             <a:endParaRPr kumimoji="1" lang="ko-KR" altLang="en-US"/>
           </a:p>
@@ -3587,10 +3587,10 @@
       </p:sp>
       <p:pic>
         <p:nvPicPr>
-          <p:cNvPr id="5" name="그림 4">
+          <p:cNvPr id="3" name="그림 2">
             <a:extLst>
               <a:ext uri="{FF2B5EF4-FFF2-40B4-BE49-F238E27FC236}">
-                <a16:creationId xmlns:a16="http://schemas.microsoft.com/office/drawing/2014/main" id="{FEF83162-15DC-2D4D-82D3-314123B91A15}"/>
+                <a16:creationId xmlns:a16="http://schemas.microsoft.com/office/drawing/2014/main" id="{A807E95F-58C8-F743-A9E0-C8DAD9C98406}"/>
               </a:ext>
             </a:extLst>
           </p:cNvPr>
@@ -3607,8 +3607,8 @@
         </p:blipFill>
         <p:spPr>
           <a:xfrm>
-            <a:off x="3232419" y="663262"/>
-            <a:ext cx="5701921" cy="4848821"/>
+            <a:off x="2057509" y="1084944"/>
+            <a:ext cx="6561437" cy="5686023"/>
           </a:xfrm>
           <a:prstGeom prst="rect">
             <a:avLst/>
@@ -3650,7 +3650,7 @@
           <p:cNvPr id="2" name="제목 1">
             <a:extLst>
               <a:ext uri="{FF2B5EF4-FFF2-40B4-BE49-F238E27FC236}">
-                <a16:creationId xmlns:a16="http://schemas.microsoft.com/office/drawing/2014/main" id="{71A634B0-4382-E443-931E-5EFE3752A49F}"/>
+                <a16:creationId xmlns:a16="http://schemas.microsoft.com/office/drawing/2014/main" id="{CAF73839-AA6D-074A-BE86-9924CE6F7736}"/>
               </a:ext>
             </a:extLst>
           </p:cNvPr>
@@ -3667,9 +3667,10 @@
           <a:lstStyle/>
           <a:p>
             <a:r>
-              <a:rPr kumimoji="1" lang="ko-KR" altLang="en-US" dirty="0"/>
-              <a:t>화학 약품 리스트 불러오기</a:t>
-            </a:r>
+              <a:rPr kumimoji="1" lang="en-US" altLang="ko-KR" dirty="0"/>
+              <a:t>Entity Class</a:t>
+            </a:r>
+            <a:endParaRPr kumimoji="1" lang="ko-KR" altLang="en-US" dirty="0"/>
           </a:p>
         </p:txBody>
       </p:sp>
@@ -3678,7 +3679,7 @@
           <p:cNvPr id="4" name="그림 3">
             <a:extLst>
               <a:ext uri="{FF2B5EF4-FFF2-40B4-BE49-F238E27FC236}">
-                <a16:creationId xmlns:a16="http://schemas.microsoft.com/office/drawing/2014/main" id="{11182DD7-155F-FF47-8008-006217F8D87D}"/>
+                <a16:creationId xmlns:a16="http://schemas.microsoft.com/office/drawing/2014/main" id="{B92A11A9-8D11-CA42-B026-409DFF866D87}"/>
               </a:ext>
             </a:extLst>
           </p:cNvPr>
@@ -3688,25 +3689,240 @@
           <p:nvPr/>
         </p:nvPicPr>
         <p:blipFill>
-          <a:blip r:embed="rId3"/>
+          <a:blip r:embed="rId2"/>
           <a:stretch>
             <a:fillRect/>
           </a:stretch>
         </p:blipFill>
         <p:spPr>
           <a:xfrm>
-            <a:off x="491393" y="1632210"/>
-            <a:ext cx="8161214" cy="2961056"/>
+            <a:off x="214657" y="1361080"/>
+            <a:ext cx="4904454" cy="3899594"/>
           </a:xfrm>
           <a:prstGeom prst="rect">
             <a:avLst/>
           </a:prstGeom>
+          <a:ln w="50800">
+            <a:solidFill>
+              <a:schemeClr val="accent4"/>
+            </a:solidFill>
+          </a:ln>
         </p:spPr>
       </p:pic>
+      <p:sp>
+        <p:nvSpPr>
+          <p:cNvPr id="5" name="TextBox 4">
+            <a:extLst>
+              <a:ext uri="{FF2B5EF4-FFF2-40B4-BE49-F238E27FC236}">
+                <a16:creationId xmlns:a16="http://schemas.microsoft.com/office/drawing/2014/main" id="{0FAF9E2E-0C2E-3348-93E9-B918F8536D39}"/>
+              </a:ext>
+            </a:extLst>
+          </p:cNvPr>
+          <p:cNvSpPr txBox="1"/>
+          <p:nvPr/>
+        </p:nvSpPr>
+        <p:spPr>
+          <a:xfrm>
+            <a:off x="5403665" y="1187561"/>
+            <a:ext cx="3525677" cy="4770537"/>
+          </a:xfrm>
+          <a:prstGeom prst="rect">
+            <a:avLst/>
+          </a:prstGeom>
+          <a:noFill/>
+        </p:spPr>
+        <p:txBody>
+          <a:bodyPr wrap="square" rtlCol="0">
+            <a:spAutoFit/>
+          </a:bodyPr>
+          <a:lstStyle/>
+          <a:p>
+            <a:r>
+              <a:rPr kumimoji="1" lang="en-US" altLang="ko-KR" sz="1600" dirty="0"/>
+              <a:t>@Entity</a:t>
+            </a:r>
+            <a:r>
+              <a:rPr kumimoji="1" lang="ko-KR" altLang="en-US" sz="1600" dirty="0"/>
+              <a:t> </a:t>
+            </a:r>
+            <a:r>
+              <a:rPr kumimoji="1" lang="ko-KR" altLang="en-US" sz="1600" dirty="0" err="1"/>
+              <a:t>어노테이션이</a:t>
+            </a:r>
+            <a:r>
+              <a:rPr kumimoji="1" lang="ko-KR" altLang="en-US" sz="1600" dirty="0"/>
+              <a:t> 적용된 클래스 </a:t>
+            </a:r>
+            <a:r>
+              <a:rPr kumimoji="1" lang="en-US" altLang="ko-KR" sz="1600" dirty="0"/>
+              <a:t>-&gt;</a:t>
+            </a:r>
+            <a:r>
+              <a:rPr kumimoji="1" lang="ko-KR" altLang="en-US" sz="1600" dirty="0"/>
+              <a:t> 이 클래스의 속성들로 이루어진 데이터베이스 테이블이 자동으로 생성되고</a:t>
+            </a:r>
+            <a:r>
+              <a:rPr kumimoji="1" lang="en-US" altLang="ko-KR" sz="1600" dirty="0"/>
+              <a:t>,</a:t>
+            </a:r>
+            <a:r>
+              <a:rPr kumimoji="1" lang="ko-KR" altLang="en-US" sz="1600" dirty="0"/>
+              <a:t> 이 클래스의 인스턴스 하나는 테이블의 행 하나와 </a:t>
+            </a:r>
+            <a:r>
+              <a:rPr kumimoji="1" lang="ko-KR" altLang="en-US" sz="1600" dirty="0" err="1"/>
+              <a:t>매핑된다</a:t>
+            </a:r>
+            <a:endParaRPr kumimoji="1" lang="en-US" altLang="ko-KR" sz="1600" dirty="0"/>
+          </a:p>
+          <a:p>
+            <a:endParaRPr kumimoji="1" lang="en-US" altLang="ko-KR" sz="1600" dirty="0"/>
+          </a:p>
+          <a:p>
+            <a:pPr marL="342900" indent="-342900">
+              <a:buAutoNum type="arabicPeriod"/>
+            </a:pPr>
+            <a:r>
+              <a:rPr kumimoji="1" lang="en-US" altLang="ko-KR" sz="1600" dirty="0"/>
+              <a:t>id, email, name, password</a:t>
+            </a:r>
+            <a:r>
+              <a:rPr kumimoji="1" lang="ko-KR" altLang="en-US" sz="1600" dirty="0"/>
+              <a:t>와 같은 클래스의 속성들은 테이블의 속성</a:t>
+            </a:r>
+            <a:r>
+              <a:rPr kumimoji="1" lang="en-US" altLang="ko-KR" sz="1600" dirty="0"/>
+              <a:t>(</a:t>
+            </a:r>
+            <a:r>
+              <a:rPr kumimoji="1" lang="ko-KR" altLang="en-US" sz="1600" dirty="0"/>
+              <a:t>열</a:t>
+            </a:r>
+            <a:r>
+              <a:rPr kumimoji="1" lang="en-US" altLang="ko-KR" sz="1600" dirty="0"/>
+              <a:t>)</a:t>
+            </a:r>
+            <a:r>
+              <a:rPr kumimoji="1" lang="ko-KR" altLang="en-US" sz="1600" dirty="0"/>
+              <a:t>에 해당된다</a:t>
+            </a:r>
+            <a:endParaRPr kumimoji="1" lang="en-US" altLang="ko-KR" sz="1600" dirty="0"/>
+          </a:p>
+          <a:p>
+            <a:pPr marL="342900" indent="-342900">
+              <a:buAutoNum type="arabicPeriod"/>
+            </a:pPr>
+            <a:r>
+              <a:rPr kumimoji="1" lang="en-US" altLang="ko-KR" sz="1600" dirty="0"/>
+              <a:t>user </a:t>
+            </a:r>
+            <a:r>
+              <a:rPr kumimoji="1" lang="ko-KR" altLang="en-US" sz="1600" dirty="0"/>
+              <a:t>테이블의 모든 데이터베이스 질의는 이 클래스의 인스턴스를 입력으로 받고</a:t>
+            </a:r>
+            <a:r>
+              <a:rPr kumimoji="1" lang="en-US" altLang="ko-KR" sz="1600" dirty="0"/>
+              <a:t>,</a:t>
+            </a:r>
+            <a:r>
+              <a:rPr kumimoji="1" lang="ko-KR" altLang="en-US" sz="1600" dirty="0"/>
+              <a:t> 결과값 또한 인스턴스이다</a:t>
+            </a:r>
+            <a:endParaRPr kumimoji="1" lang="en-US" altLang="ko-KR" sz="1600" dirty="0"/>
+          </a:p>
+          <a:p>
+            <a:pPr marL="342900" indent="-342900">
+              <a:buAutoNum type="arabicPeriod"/>
+            </a:pPr>
+            <a:r>
+              <a:rPr kumimoji="1" lang="ko-KR" altLang="en-US" sz="1600" dirty="0"/>
+              <a:t> </a:t>
+            </a:r>
+            <a:r>
+              <a:rPr kumimoji="1" lang="en-US" altLang="ko-KR" sz="1600" dirty="0"/>
+              <a:t>@</a:t>
+            </a:r>
+            <a:r>
+              <a:rPr kumimoji="1" lang="en-US" altLang="ko-KR" sz="1600" dirty="0" err="1"/>
+              <a:t>ManyToMany</a:t>
+            </a:r>
+            <a:r>
+              <a:rPr kumimoji="1" lang="ko-KR" altLang="en-US" sz="1600" dirty="0"/>
+              <a:t> </a:t>
+            </a:r>
+            <a:r>
+              <a:rPr kumimoji="1" lang="ko-KR" altLang="en-US" sz="1600" dirty="0" err="1"/>
+              <a:t>어노테이션을</a:t>
+            </a:r>
+            <a:r>
+              <a:rPr kumimoji="1" lang="ko-KR" altLang="en-US" sz="1600" dirty="0"/>
+              <a:t> 통해 </a:t>
+            </a:r>
+            <a:r>
+              <a:rPr kumimoji="1" lang="en-US" altLang="ko-KR" sz="1600" dirty="0"/>
+              <a:t>user</a:t>
+            </a:r>
+            <a:r>
+              <a:rPr kumimoji="1" lang="ko-KR" altLang="en-US" sz="1600" dirty="0"/>
+              <a:t>와 </a:t>
+            </a:r>
+            <a:r>
+              <a:rPr kumimoji="1" lang="en-US" altLang="ko-KR" sz="1600" dirty="0"/>
+              <a:t>chemical</a:t>
+            </a:r>
+            <a:r>
+              <a:rPr kumimoji="1" lang="ko-KR" altLang="en-US" sz="1600" dirty="0"/>
+              <a:t> 테이블 간의 다대다 관계를 맺어 주었다</a:t>
+            </a:r>
+            <a:endParaRPr kumimoji="1" lang="en-US" altLang="ko-KR" sz="1600" dirty="0"/>
+          </a:p>
+          <a:p>
+            <a:pPr marL="342900" indent="-342900">
+              <a:buAutoNum type="arabicPeriod"/>
+            </a:pPr>
+            <a:r>
+              <a:rPr kumimoji="1" lang="ko-KR" altLang="en-US" sz="1600" dirty="0"/>
+              <a:t>모든 </a:t>
+            </a:r>
+            <a:r>
+              <a:rPr kumimoji="1" lang="ko-KR" altLang="en-US" sz="1600" dirty="0" err="1"/>
+              <a:t>로직은</a:t>
+            </a:r>
+            <a:r>
+              <a:rPr kumimoji="1" lang="ko-KR" altLang="en-US" sz="1600" dirty="0"/>
+              <a:t> </a:t>
+            </a:r>
+            <a:r>
+              <a:rPr kumimoji="1" lang="en-US" altLang="ko-KR" sz="1600" dirty="0"/>
+              <a:t>entity</a:t>
+            </a:r>
+            <a:r>
+              <a:rPr kumimoji="1" lang="ko-KR" altLang="en-US" sz="1600" dirty="0"/>
+              <a:t> 클래스에 포함 되고 </a:t>
+            </a:r>
+            <a:r>
+              <a:rPr kumimoji="1" lang="en-US" altLang="ko-KR" sz="1600" dirty="0"/>
+              <a:t>control class</a:t>
+            </a:r>
+            <a:r>
+              <a:rPr kumimoji="1" lang="ko-KR" altLang="en-US" sz="1600" dirty="0"/>
+              <a:t>에서 해당 </a:t>
+            </a:r>
+            <a:r>
+              <a:rPr kumimoji="1" lang="ko-KR" altLang="en-US" sz="1600" dirty="0" err="1"/>
+              <a:t>메소드를</a:t>
+            </a:r>
+            <a:r>
+              <a:rPr kumimoji="1" lang="ko-KR" altLang="en-US" sz="1600" dirty="0"/>
+              <a:t> 호출하게 된다</a:t>
+            </a:r>
+          </a:p>
+        </p:txBody>
+      </p:sp>
     </p:spTree>
     <p:extLst>
       <p:ext uri="{BB962C8B-B14F-4D97-AF65-F5344CB8AC3E}">
-        <p14:creationId xmlns:p14="http://schemas.microsoft.com/office/powerpoint/2010/main" val="1061804634"/>
+        <p14:creationId xmlns:p14="http://schemas.microsoft.com/office/powerpoint/2010/main" val="4209812208"/>
       </p:ext>
     </p:extLst>
   </p:cSld>
@@ -3738,7 +3954,7 @@
           <p:cNvPr id="2" name="제목 1">
             <a:extLst>
               <a:ext uri="{FF2B5EF4-FFF2-40B4-BE49-F238E27FC236}">
-                <a16:creationId xmlns:a16="http://schemas.microsoft.com/office/drawing/2014/main" id="{98755B68-F0C7-3043-B982-2555679559EA}"/>
+                <a16:creationId xmlns:a16="http://schemas.microsoft.com/office/drawing/2014/main" id="{CAF73839-AA6D-074A-BE86-9924CE6F7736}"/>
               </a:ext>
             </a:extLst>
           </p:cNvPr>
@@ -3749,269 +3965,25 @@
             <p:ph type="title"/>
           </p:nvPr>
         </p:nvSpPr>
-        <p:spPr>
-          <a:xfrm>
-            <a:off x="320306" y="281318"/>
-            <a:ext cx="7886700" cy="1325563"/>
-          </a:xfrm>
-        </p:spPr>
+        <p:spPr/>
         <p:txBody>
           <a:bodyPr/>
           <a:lstStyle/>
           <a:p>
             <a:r>
               <a:rPr kumimoji="1" lang="en-US" altLang="ko-KR" dirty="0"/>
-              <a:t>Implementation</a:t>
+              <a:t>Entity Class</a:t>
             </a:r>
             <a:endParaRPr kumimoji="1" lang="ko-KR" altLang="en-US" dirty="0"/>
           </a:p>
         </p:txBody>
       </p:sp>
-      <p:grpSp>
-        <p:nvGrpSpPr>
-          <p:cNvPr id="6" name="그룹 5">
+      <p:sp>
+        <p:nvSpPr>
+          <p:cNvPr id="5" name="TextBox 4">
             <a:extLst>
               <a:ext uri="{FF2B5EF4-FFF2-40B4-BE49-F238E27FC236}">
-                <a16:creationId xmlns:a16="http://schemas.microsoft.com/office/drawing/2014/main" id="{90200A1A-B778-8648-A505-4F6047769893}"/>
-              </a:ext>
-            </a:extLst>
-          </p:cNvPr>
-          <p:cNvGrpSpPr/>
-          <p:nvPr/>
-        </p:nvGrpSpPr>
-        <p:grpSpPr>
-          <a:xfrm>
-            <a:off x="788146" y="3100812"/>
-            <a:ext cx="7204472" cy="3311294"/>
-            <a:chOff x="838200" y="1871442"/>
-            <a:chExt cx="8077200" cy="3721100"/>
-          </a:xfrm>
-        </p:grpSpPr>
-        <p:pic>
-          <p:nvPicPr>
-            <p:cNvPr id="4" name="그림 3">
-              <a:extLst>
-                <a:ext uri="{FF2B5EF4-FFF2-40B4-BE49-F238E27FC236}">
-                  <a16:creationId xmlns:a16="http://schemas.microsoft.com/office/drawing/2014/main" id="{DFC3F464-E59C-4E49-B437-E9EBAD1C11F0}"/>
-                </a:ext>
-              </a:extLst>
-            </p:cNvPr>
-            <p:cNvPicPr>
-              <a:picLocks noChangeAspect="1"/>
-            </p:cNvPicPr>
-            <p:nvPr/>
-          </p:nvPicPr>
-          <p:blipFill>
-            <a:blip r:embed="rId2"/>
-            <a:stretch>
-              <a:fillRect/>
-            </a:stretch>
-          </p:blipFill>
-          <p:spPr>
-            <a:xfrm>
-              <a:off x="838200" y="1871442"/>
-              <a:ext cx="8077200" cy="3721100"/>
-            </a:xfrm>
-            <a:prstGeom prst="rect">
-              <a:avLst/>
-            </a:prstGeom>
-          </p:spPr>
-        </p:pic>
-        <p:sp>
-          <p:nvSpPr>
-            <p:cNvPr id="5" name="직사각형 4">
-              <a:extLst>
-                <a:ext uri="{FF2B5EF4-FFF2-40B4-BE49-F238E27FC236}">
-                  <a16:creationId xmlns:a16="http://schemas.microsoft.com/office/drawing/2014/main" id="{C4EE269D-F7FD-5446-A869-9227B725247F}"/>
-                </a:ext>
-              </a:extLst>
-            </p:cNvPr>
-            <p:cNvSpPr/>
-            <p:nvPr/>
-          </p:nvSpPr>
-          <p:spPr>
-            <a:xfrm>
-              <a:off x="1071563" y="4229100"/>
-              <a:ext cx="7843837" cy="1257300"/>
-            </a:xfrm>
-            <a:prstGeom prst="rect">
-              <a:avLst/>
-            </a:prstGeom>
-            <a:solidFill>
-              <a:schemeClr val="accent4">
-                <a:alpha val="21000"/>
-              </a:schemeClr>
-            </a:solidFill>
-            <a:ln>
-              <a:noFill/>
-            </a:ln>
-          </p:spPr>
-          <p:style>
-            <a:lnRef idx="2">
-              <a:schemeClr val="accent1">
-                <a:shade val="50000"/>
-              </a:schemeClr>
-            </a:lnRef>
-            <a:fillRef idx="1">
-              <a:schemeClr val="accent1"/>
-            </a:fillRef>
-            <a:effectRef idx="0">
-              <a:schemeClr val="accent1"/>
-            </a:effectRef>
-            <a:fontRef idx="minor">
-              <a:schemeClr val="lt1"/>
-            </a:fontRef>
-          </p:style>
-          <p:txBody>
-            <a:bodyPr rot="0" spcFirstLastPara="0" vertOverflow="overflow" horzOverflow="overflow" vert="horz" wrap="square" lIns="68580" tIns="34290" rIns="68580" bIns="34290" numCol="1" spcCol="0" rtlCol="0" fromWordArt="0" anchor="ctr" anchorCtr="0" forceAA="0" compatLnSpc="1">
-              <a:prstTxWarp prst="textNoShape">
-                <a:avLst/>
-              </a:prstTxWarp>
-              <a:noAutofit/>
-            </a:bodyPr>
-            <a:lstStyle/>
-            <a:p>
-              <a:pPr algn="ctr"/>
-              <a:endParaRPr kumimoji="1" lang="ko-KR" altLang="en-US" sz="1013"/>
-            </a:p>
-          </p:txBody>
-        </p:sp>
-      </p:grpSp>
-      <p:cxnSp>
-        <p:nvCxnSpPr>
-          <p:cNvPr id="10" name="직선 연결선[R] 9">
-            <a:extLst>
-              <a:ext uri="{FF2B5EF4-FFF2-40B4-BE49-F238E27FC236}">
-                <a16:creationId xmlns:a16="http://schemas.microsoft.com/office/drawing/2014/main" id="{945FB098-1D3D-324D-A75F-9749529A1356}"/>
-              </a:ext>
-            </a:extLst>
-          </p:cNvPr>
-          <p:cNvCxnSpPr>
-            <a:cxnSpLocks/>
-          </p:cNvCxnSpPr>
-          <p:nvPr/>
-        </p:nvCxnSpPr>
-        <p:spPr>
-          <a:xfrm>
-            <a:off x="1616821" y="3411731"/>
-            <a:ext cx="1125140" cy="0"/>
-          </a:xfrm>
-          <a:prstGeom prst="line">
-            <a:avLst/>
-          </a:prstGeom>
-          <a:ln w="50800">
-            <a:solidFill>
-              <a:schemeClr val="accent4"/>
-            </a:solidFill>
-          </a:ln>
-        </p:spPr>
-        <p:style>
-          <a:lnRef idx="1">
-            <a:schemeClr val="accent1"/>
-          </a:lnRef>
-          <a:fillRef idx="0">
-            <a:schemeClr val="accent1"/>
-          </a:fillRef>
-          <a:effectRef idx="0">
-            <a:schemeClr val="accent1"/>
-          </a:effectRef>
-          <a:fontRef idx="minor">
-            <a:schemeClr val="tx1"/>
-          </a:fontRef>
-        </p:style>
-      </p:cxnSp>
-      <p:cxnSp>
-        <p:nvCxnSpPr>
-          <p:cNvPr id="12" name="직선 연결선[R] 11">
-            <a:extLst>
-              <a:ext uri="{FF2B5EF4-FFF2-40B4-BE49-F238E27FC236}">
-                <a16:creationId xmlns:a16="http://schemas.microsoft.com/office/drawing/2014/main" id="{D5FF9D32-FB93-A743-A1B6-1F156E1ED88B}"/>
-              </a:ext>
-            </a:extLst>
-          </p:cNvPr>
-          <p:cNvCxnSpPr>
-            <a:cxnSpLocks/>
-          </p:cNvCxnSpPr>
-          <p:nvPr/>
-        </p:nvCxnSpPr>
-        <p:spPr>
-          <a:xfrm>
-            <a:off x="3992117" y="5744165"/>
-            <a:ext cx="2457450" cy="0"/>
-          </a:xfrm>
-          <a:prstGeom prst="line">
-            <a:avLst/>
-          </a:prstGeom>
-          <a:ln w="50800">
-            <a:solidFill>
-              <a:schemeClr val="accent4"/>
-            </a:solidFill>
-          </a:ln>
-        </p:spPr>
-        <p:style>
-          <a:lnRef idx="1">
-            <a:schemeClr val="accent1"/>
-          </a:lnRef>
-          <a:fillRef idx="0">
-            <a:schemeClr val="accent1"/>
-          </a:fillRef>
-          <a:effectRef idx="0">
-            <a:schemeClr val="accent1"/>
-          </a:effectRef>
-          <a:fontRef idx="minor">
-            <a:schemeClr val="tx1"/>
-          </a:fontRef>
-        </p:style>
-      </p:cxnSp>
-      <p:cxnSp>
-        <p:nvCxnSpPr>
-          <p:cNvPr id="15" name="직선 연결선[R] 14">
-            <a:extLst>
-              <a:ext uri="{FF2B5EF4-FFF2-40B4-BE49-F238E27FC236}">
-                <a16:creationId xmlns:a16="http://schemas.microsoft.com/office/drawing/2014/main" id="{BEB65284-BC59-464F-8118-6DFD8C83B1E5}"/>
-              </a:ext>
-            </a:extLst>
-          </p:cNvPr>
-          <p:cNvCxnSpPr>
-            <a:cxnSpLocks/>
-          </p:cNvCxnSpPr>
-          <p:nvPr/>
-        </p:nvCxnSpPr>
-        <p:spPr>
-          <a:xfrm>
-            <a:off x="2457998" y="5515565"/>
-            <a:ext cx="1534121" cy="0"/>
-          </a:xfrm>
-          <a:prstGeom prst="line">
-            <a:avLst/>
-          </a:prstGeom>
-          <a:ln w="50800">
-            <a:solidFill>
-              <a:schemeClr val="accent4"/>
-            </a:solidFill>
-          </a:ln>
-        </p:spPr>
-        <p:style>
-          <a:lnRef idx="1">
-            <a:schemeClr val="accent1"/>
-          </a:lnRef>
-          <a:fillRef idx="0">
-            <a:schemeClr val="accent1"/>
-          </a:fillRef>
-          <a:effectRef idx="0">
-            <a:schemeClr val="accent1"/>
-          </a:effectRef>
-          <a:fontRef idx="minor">
-            <a:schemeClr val="tx1"/>
-          </a:fontRef>
-        </p:style>
-      </p:cxnSp>
-      <p:sp>
-        <p:nvSpPr>
-          <p:cNvPr id="17" name="TextBox 16">
-            <a:extLst>
-              <a:ext uri="{FF2B5EF4-FFF2-40B4-BE49-F238E27FC236}">
-                <a16:creationId xmlns:a16="http://schemas.microsoft.com/office/drawing/2014/main" id="{CA3923D9-7288-A54D-910D-A52D2C912D57}"/>
+                <a16:creationId xmlns:a16="http://schemas.microsoft.com/office/drawing/2014/main" id="{0FAF9E2E-0C2E-3348-93E9-B918F8536D39}"/>
               </a:ext>
             </a:extLst>
           </p:cNvPr>
@@ -4020,20 +3992,13 @@
         </p:nvSpPr>
         <p:spPr>
           <a:xfrm>
-            <a:off x="2264781" y="4953863"/>
-            <a:ext cx="6649382" cy="248209"/>
+            <a:off x="5403665" y="1187561"/>
+            <a:ext cx="3525677" cy="4770537"/>
           </a:xfrm>
           <a:prstGeom prst="rect">
             <a:avLst/>
           </a:prstGeom>
-          <a:solidFill>
-            <a:schemeClr val="bg1"/>
-          </a:solidFill>
-          <a:ln w="50800">
-            <a:solidFill>
-              <a:schemeClr val="accent2"/>
-            </a:solidFill>
-          </a:ln>
+          <a:noFill/>
         </p:spPr>
         <p:txBody>
           <a:bodyPr wrap="square" rtlCol="0">
@@ -4042,134 +4007,193 @@
           <a:lstStyle/>
           <a:p>
             <a:r>
-              <a:rPr kumimoji="1" lang="ko-KR" altLang="en-US" sz="1013" dirty="0"/>
-              <a:t>해당 </a:t>
-            </a:r>
-            <a:r>
-              <a:rPr kumimoji="1" lang="en-US" altLang="ko-KR" sz="1013" dirty="0" err="1"/>
-              <a:t>userID</a:t>
-            </a:r>
-            <a:r>
-              <a:rPr kumimoji="1" lang="ko-KR" altLang="en-US" sz="1013" dirty="0"/>
-              <a:t>가 가지고 있는 화학약품 리스트에 대한 </a:t>
-            </a:r>
-            <a:r>
-              <a:rPr kumimoji="1" lang="en-US" altLang="ko-KR" sz="1013" dirty="0"/>
-              <a:t>read </a:t>
-            </a:r>
-            <a:r>
-              <a:rPr kumimoji="1" lang="ko-KR" altLang="en-US" sz="1013" dirty="0"/>
-              <a:t>요청 </a:t>
-            </a:r>
-            <a:r>
-              <a:rPr kumimoji="1" lang="en-US" altLang="ko-KR" sz="1013" dirty="0"/>
+              <a:rPr kumimoji="1" lang="en-US" altLang="ko-KR" sz="1600" dirty="0"/>
+              <a:t>@Entity</a:t>
+            </a:r>
+            <a:r>
+              <a:rPr kumimoji="1" lang="ko-KR" altLang="en-US" sz="1600" dirty="0"/>
+              <a:t> </a:t>
+            </a:r>
+            <a:r>
+              <a:rPr kumimoji="1" lang="ko-KR" altLang="en-US" sz="1600" dirty="0" err="1"/>
+              <a:t>어노테이션이</a:t>
+            </a:r>
+            <a:r>
+              <a:rPr kumimoji="1" lang="ko-KR" altLang="en-US" sz="1600" dirty="0"/>
+              <a:t> 적용된 클래스 </a:t>
+            </a:r>
+            <a:r>
+              <a:rPr kumimoji="1" lang="en-US" altLang="ko-KR" sz="1600" dirty="0"/>
               <a:t>-&gt;</a:t>
             </a:r>
             <a:r>
-              <a:rPr kumimoji="1" lang="ko-KR" altLang="en-US" sz="1013" dirty="0"/>
-              <a:t> 자동으로  </a:t>
-            </a:r>
-            <a:r>
-              <a:rPr kumimoji="1" lang="ko-KR" altLang="en-US" sz="1013" dirty="0" err="1"/>
-              <a:t>매핑됨</a:t>
-            </a:r>
-            <a:endParaRPr kumimoji="1" lang="ko-KR" altLang="en-US" sz="1013" dirty="0"/>
-          </a:p>
-        </p:txBody>
-      </p:sp>
-      <p:sp>
-        <p:nvSpPr>
-          <p:cNvPr id="18" name="TextBox 17">
+              <a:rPr kumimoji="1" lang="ko-KR" altLang="en-US" sz="1600" dirty="0"/>
+              <a:t> 이 클래스의 속성들로 이루어진 데이터베이스 테이블이 자동으로 생성되고</a:t>
+            </a:r>
+            <a:r>
+              <a:rPr kumimoji="1" lang="en-US" altLang="ko-KR" sz="1600" dirty="0"/>
+              <a:t>,</a:t>
+            </a:r>
+            <a:r>
+              <a:rPr kumimoji="1" lang="ko-KR" altLang="en-US" sz="1600" dirty="0"/>
+              <a:t> 이 클래스의 인스턴스 하나는 테이블의 행 하나와 </a:t>
+            </a:r>
+            <a:r>
+              <a:rPr kumimoji="1" lang="ko-KR" altLang="en-US" sz="1600" dirty="0" err="1"/>
+              <a:t>매핑된다</a:t>
+            </a:r>
+            <a:endParaRPr kumimoji="1" lang="en-US" altLang="ko-KR" sz="1600" dirty="0"/>
+          </a:p>
+          <a:p>
+            <a:endParaRPr kumimoji="1" lang="en-US" altLang="ko-KR" sz="1600" dirty="0"/>
+          </a:p>
+          <a:p>
+            <a:pPr marL="342900" indent="-342900">
+              <a:buAutoNum type="arabicPeriod"/>
+            </a:pPr>
+            <a:r>
+              <a:rPr kumimoji="1" lang="en-US" altLang="ko-KR" sz="1600" dirty="0"/>
+              <a:t>id, email, name, password</a:t>
+            </a:r>
+            <a:r>
+              <a:rPr kumimoji="1" lang="ko-KR" altLang="en-US" sz="1600" dirty="0"/>
+              <a:t>와 같은 클래스의 속성들은 테이블의 속성</a:t>
+            </a:r>
+            <a:r>
+              <a:rPr kumimoji="1" lang="en-US" altLang="ko-KR" sz="1600" dirty="0"/>
+              <a:t>(</a:t>
+            </a:r>
+            <a:r>
+              <a:rPr kumimoji="1" lang="ko-KR" altLang="en-US" sz="1600" dirty="0"/>
+              <a:t>열</a:t>
+            </a:r>
+            <a:r>
+              <a:rPr kumimoji="1" lang="en-US" altLang="ko-KR" sz="1600" dirty="0"/>
+              <a:t>)</a:t>
+            </a:r>
+            <a:r>
+              <a:rPr kumimoji="1" lang="ko-KR" altLang="en-US" sz="1600" dirty="0"/>
+              <a:t>에 해당된다</a:t>
+            </a:r>
+            <a:endParaRPr kumimoji="1" lang="en-US" altLang="ko-KR" sz="1600" dirty="0"/>
+          </a:p>
+          <a:p>
+            <a:pPr marL="342900" indent="-342900">
+              <a:buAutoNum type="arabicPeriod"/>
+            </a:pPr>
+            <a:r>
+              <a:rPr kumimoji="1" lang="en-US" altLang="ko-KR" sz="1600" dirty="0"/>
+              <a:t>user </a:t>
+            </a:r>
+            <a:r>
+              <a:rPr kumimoji="1" lang="ko-KR" altLang="en-US" sz="1600" dirty="0"/>
+              <a:t>테이블의 모든 데이터베이스 질의는 이 클래스의 인스턴스를 입력으로 받고</a:t>
+            </a:r>
+            <a:r>
+              <a:rPr kumimoji="1" lang="en-US" altLang="ko-KR" sz="1600" dirty="0"/>
+              <a:t>,</a:t>
+            </a:r>
+            <a:r>
+              <a:rPr kumimoji="1" lang="ko-KR" altLang="en-US" sz="1600" dirty="0"/>
+              <a:t> 결과값 또한 인스턴스이다</a:t>
+            </a:r>
+            <a:endParaRPr kumimoji="1" lang="en-US" altLang="ko-KR" sz="1600" dirty="0"/>
+          </a:p>
+          <a:p>
+            <a:pPr marL="342900" indent="-342900">
+              <a:buAutoNum type="arabicPeriod"/>
+            </a:pPr>
+            <a:r>
+              <a:rPr kumimoji="1" lang="ko-KR" altLang="en-US" sz="1600" dirty="0"/>
+              <a:t> </a:t>
+            </a:r>
+            <a:r>
+              <a:rPr kumimoji="1" lang="en-US" altLang="ko-KR" sz="1600" dirty="0"/>
+              <a:t>@</a:t>
+            </a:r>
+            <a:r>
+              <a:rPr kumimoji="1" lang="en-US" altLang="ko-KR" sz="1600" dirty="0" err="1"/>
+              <a:t>ManyToMany</a:t>
+            </a:r>
+            <a:r>
+              <a:rPr kumimoji="1" lang="ko-KR" altLang="en-US" sz="1600" dirty="0"/>
+              <a:t> </a:t>
+            </a:r>
+            <a:r>
+              <a:rPr kumimoji="1" lang="ko-KR" altLang="en-US" sz="1600" dirty="0" err="1"/>
+              <a:t>어노테이션을</a:t>
+            </a:r>
+            <a:r>
+              <a:rPr kumimoji="1" lang="ko-KR" altLang="en-US" sz="1600" dirty="0"/>
+              <a:t> 통해 </a:t>
+            </a:r>
+            <a:r>
+              <a:rPr kumimoji="1" lang="en-US" altLang="ko-KR" sz="1600" dirty="0"/>
+              <a:t>user</a:t>
+            </a:r>
+            <a:r>
+              <a:rPr kumimoji="1" lang="ko-KR" altLang="en-US" sz="1600" dirty="0"/>
+              <a:t>와 </a:t>
+            </a:r>
+            <a:r>
+              <a:rPr kumimoji="1" lang="en-US" altLang="ko-KR" sz="1600" dirty="0"/>
+              <a:t>chemical</a:t>
+            </a:r>
+            <a:r>
+              <a:rPr kumimoji="1" lang="ko-KR" altLang="en-US" sz="1600" dirty="0"/>
+              <a:t> 테이블 간의 다대다 관계를 맺어 주었다</a:t>
+            </a:r>
+            <a:endParaRPr kumimoji="1" lang="en-US" altLang="ko-KR" sz="1600" dirty="0"/>
+          </a:p>
+          <a:p>
+            <a:pPr marL="342900" indent="-342900">
+              <a:buAutoNum type="arabicPeriod"/>
+            </a:pPr>
+            <a:r>
+              <a:rPr kumimoji="1" lang="ko-KR" altLang="en-US" sz="1600" dirty="0"/>
+              <a:t>모든 </a:t>
+            </a:r>
+            <a:r>
+              <a:rPr kumimoji="1" lang="ko-KR" altLang="en-US" sz="1600" dirty="0" err="1"/>
+              <a:t>로직은</a:t>
+            </a:r>
+            <a:r>
+              <a:rPr kumimoji="1" lang="ko-KR" altLang="en-US" sz="1600" dirty="0"/>
+              <a:t> </a:t>
+            </a:r>
+            <a:r>
+              <a:rPr kumimoji="1" lang="en-US" altLang="ko-KR" sz="1600" dirty="0"/>
+              <a:t>entity</a:t>
+            </a:r>
+            <a:r>
+              <a:rPr kumimoji="1" lang="ko-KR" altLang="en-US" sz="1600" dirty="0"/>
+              <a:t> 클래스에 포함 되고 </a:t>
+            </a:r>
+            <a:r>
+              <a:rPr kumimoji="1" lang="en-US" altLang="ko-KR" sz="1600" dirty="0"/>
+              <a:t>control class</a:t>
+            </a:r>
+            <a:r>
+              <a:rPr kumimoji="1" lang="ko-KR" altLang="en-US" sz="1600" dirty="0"/>
+              <a:t>에서 해당 </a:t>
+            </a:r>
+            <a:r>
+              <a:rPr kumimoji="1" lang="ko-KR" altLang="en-US" sz="1600" dirty="0" err="1"/>
+              <a:t>메소드를</a:t>
+            </a:r>
+            <a:r>
+              <a:rPr kumimoji="1" lang="ko-KR" altLang="en-US" sz="1600" dirty="0"/>
+              <a:t> 호출하게 된다</a:t>
+            </a:r>
+          </a:p>
+        </p:txBody>
+      </p:sp>
+      <p:pic>
+        <p:nvPicPr>
+          <p:cNvPr id="6" name="그림 5">
             <a:extLst>
               <a:ext uri="{FF2B5EF4-FFF2-40B4-BE49-F238E27FC236}">
-                <a16:creationId xmlns:a16="http://schemas.microsoft.com/office/drawing/2014/main" id="{92A6FDF4-76D5-A94D-B819-721A16AC3820}"/>
-              </a:ext>
-            </a:extLst>
-          </p:cNvPr>
-          <p:cNvSpPr txBox="1"/>
-          <p:nvPr/>
-        </p:nvSpPr>
-        <p:spPr>
-          <a:xfrm>
-            <a:off x="5561786" y="5804762"/>
-            <a:ext cx="3566688" cy="404085"/>
-          </a:xfrm>
-          <a:prstGeom prst="rect">
-            <a:avLst/>
-          </a:prstGeom>
-          <a:solidFill>
-            <a:schemeClr val="bg1"/>
-          </a:solidFill>
-          <a:ln w="50800">
-            <a:solidFill>
-              <a:schemeClr val="accent2"/>
-            </a:solidFill>
-          </a:ln>
-        </p:spPr>
-        <p:txBody>
-          <a:bodyPr wrap="square" rtlCol="0">
-            <a:spAutoFit/>
-          </a:bodyPr>
-          <a:lstStyle/>
-          <a:p>
-            <a:r>
-              <a:rPr kumimoji="1" lang="en-US" altLang="ko-KR" sz="1013" dirty="0" err="1"/>
-              <a:t>chemicalService</a:t>
-            </a:r>
-            <a:r>
-              <a:rPr kumimoji="1" lang="ko-KR" altLang="en-US" sz="1013" dirty="0"/>
-              <a:t>의 </a:t>
-            </a:r>
-            <a:r>
-              <a:rPr kumimoji="1" lang="en-US" altLang="ko-KR" sz="1013" dirty="0" err="1"/>
-              <a:t>getChemicalList</a:t>
-            </a:r>
-            <a:r>
-              <a:rPr kumimoji="1" lang="ko-KR" altLang="en-US" sz="1013" dirty="0" err="1"/>
-              <a:t>를</a:t>
-            </a:r>
-            <a:r>
-              <a:rPr kumimoji="1" lang="ko-KR" altLang="en-US" sz="1013" dirty="0"/>
-              <a:t> 호출</a:t>
-            </a:r>
-            <a:r>
-              <a:rPr kumimoji="1" lang="en-US" altLang="ko-KR" sz="1013" dirty="0"/>
-              <a:t>.</a:t>
-            </a:r>
-            <a:r>
-              <a:rPr kumimoji="1" lang="ko-KR" altLang="en-US" sz="1013" dirty="0"/>
-              <a:t> </a:t>
-            </a:r>
-            <a:r>
-              <a:rPr kumimoji="1" lang="en-US" altLang="ko-KR" sz="1013" dirty="0"/>
-              <a:t>parameter</a:t>
-            </a:r>
-            <a:r>
-              <a:rPr kumimoji="1" lang="ko-KR" altLang="en-US" sz="1013" dirty="0"/>
-              <a:t>는</a:t>
-            </a:r>
-            <a:r>
-              <a:rPr kumimoji="1" lang="en-US" altLang="ko-KR" sz="1013" dirty="0"/>
-              <a:t> </a:t>
-            </a:r>
-            <a:r>
-              <a:rPr kumimoji="1" lang="ko-KR" altLang="en-US" sz="1013" dirty="0"/>
-              <a:t>요청으로 들어온 </a:t>
-            </a:r>
-            <a:r>
-              <a:rPr kumimoji="1" lang="en-US" altLang="ko-KR" sz="1013" dirty="0" err="1"/>
-              <a:t>userID</a:t>
-            </a:r>
-            <a:endParaRPr kumimoji="1" lang="ko-KR" altLang="en-US" sz="1013" dirty="0"/>
-          </a:p>
-        </p:txBody>
-      </p:sp>
-      <p:pic>
-        <p:nvPicPr>
-          <p:cNvPr id="20" name="그림 19">
-            <a:extLst>
-              <a:ext uri="{FF2B5EF4-FFF2-40B4-BE49-F238E27FC236}">
-                <a16:creationId xmlns:a16="http://schemas.microsoft.com/office/drawing/2014/main" id="{E9C3C1AE-6586-6A48-95F8-699AADB8FAEA}"/>
+                <a16:creationId xmlns:a16="http://schemas.microsoft.com/office/drawing/2014/main" id="{F726538F-E0D0-4D4E-AD59-7950E06502AD}"/>
               </a:ext>
             </a:extLst>
           </p:cNvPr>
@@ -4179,15 +4203,15 @@
           <p:nvPr/>
         </p:nvPicPr>
         <p:blipFill>
-          <a:blip r:embed="rId3"/>
+          <a:blip r:embed="rId2"/>
           <a:stretch>
             <a:fillRect/>
           </a:stretch>
         </p:blipFill>
         <p:spPr>
           <a:xfrm>
-            <a:off x="3641711" y="1374744"/>
-            <a:ext cx="2834681" cy="2019225"/>
+            <a:off x="427540" y="1361080"/>
+            <a:ext cx="4456492" cy="4395776"/>
           </a:xfrm>
           <a:prstGeom prst="rect">
             <a:avLst/>
@@ -4202,7 +4226,7 @@
     </p:spTree>
     <p:extLst>
       <p:ext uri="{BB962C8B-B14F-4D97-AF65-F5344CB8AC3E}">
-        <p14:creationId xmlns:p14="http://schemas.microsoft.com/office/powerpoint/2010/main" val="4053958125"/>
+        <p14:creationId xmlns:p14="http://schemas.microsoft.com/office/powerpoint/2010/main" val="4122206618"/>
       </p:ext>
     </p:extLst>
   </p:cSld>
@@ -4234,7 +4258,7 @@
           <p:cNvPr id="2" name="제목 1">
             <a:extLst>
               <a:ext uri="{FF2B5EF4-FFF2-40B4-BE49-F238E27FC236}">
-                <a16:creationId xmlns:a16="http://schemas.microsoft.com/office/drawing/2014/main" id="{D2D48E45-375F-CE45-A39C-63EF6BE8E6EB}"/>
+                <a16:creationId xmlns:a16="http://schemas.microsoft.com/office/drawing/2014/main" id="{8E1CFC23-DBDA-5342-B55D-6BDE531DAEDB}"/>
               </a:ext>
             </a:extLst>
           </p:cNvPr>
@@ -4251,129 +4275,23 @@
           <a:lstStyle/>
           <a:p>
             <a:r>
+              <a:rPr kumimoji="1" lang="en-US" altLang="ko-KR" dirty="0" err="1"/>
+              <a:t>CrudRepository</a:t>
+            </a:r>
+            <a:r>
               <a:rPr kumimoji="1" lang="en-US" altLang="ko-KR" dirty="0"/>
-              <a:t>Implementation</a:t>
+              <a:t> Interface</a:t>
             </a:r>
             <a:endParaRPr kumimoji="1" lang="ko-KR" altLang="en-US" dirty="0"/>
           </a:p>
         </p:txBody>
       </p:sp>
-      <p:grpSp>
-        <p:nvGrpSpPr>
-          <p:cNvPr id="6" name="그룹 5">
+      <p:pic>
+        <p:nvPicPr>
+          <p:cNvPr id="5" name="그림 4">
             <a:extLst>
               <a:ext uri="{FF2B5EF4-FFF2-40B4-BE49-F238E27FC236}">
-                <a16:creationId xmlns:a16="http://schemas.microsoft.com/office/drawing/2014/main" id="{ECE4B2F9-173B-D948-8A6E-7DDF966CA71A}"/>
-              </a:ext>
-            </a:extLst>
-          </p:cNvPr>
-          <p:cNvGrpSpPr/>
-          <p:nvPr/>
-        </p:nvGrpSpPr>
-        <p:grpSpPr>
-          <a:xfrm>
-            <a:off x="710714" y="2835573"/>
-            <a:ext cx="5393531" cy="3442317"/>
-            <a:chOff x="838200" y="1903119"/>
-            <a:chExt cx="7191375" cy="4589756"/>
-          </a:xfrm>
-        </p:grpSpPr>
-        <p:pic>
-          <p:nvPicPr>
-            <p:cNvPr id="4" name="그림 3">
-              <a:extLst>
-                <a:ext uri="{FF2B5EF4-FFF2-40B4-BE49-F238E27FC236}">
-                  <a16:creationId xmlns:a16="http://schemas.microsoft.com/office/drawing/2014/main" id="{D3ECA19A-58C8-7B44-89A1-A81F1EE7CCBB}"/>
-                </a:ext>
-              </a:extLst>
-            </p:cNvPr>
-            <p:cNvPicPr>
-              <a:picLocks noChangeAspect="1"/>
-            </p:cNvPicPr>
-            <p:nvPr/>
-          </p:nvPicPr>
-          <p:blipFill>
-            <a:blip r:embed="rId2"/>
-            <a:stretch>
-              <a:fillRect/>
-            </a:stretch>
-          </p:blipFill>
-          <p:spPr>
-            <a:xfrm>
-              <a:off x="838200" y="1903119"/>
-              <a:ext cx="7191375" cy="4589756"/>
-            </a:xfrm>
-            <a:prstGeom prst="rect">
-              <a:avLst/>
-            </a:prstGeom>
-          </p:spPr>
-        </p:pic>
-        <p:sp>
-          <p:nvSpPr>
-            <p:cNvPr id="5" name="직사각형 4">
-              <a:extLst>
-                <a:ext uri="{FF2B5EF4-FFF2-40B4-BE49-F238E27FC236}">
-                  <a16:creationId xmlns:a16="http://schemas.microsoft.com/office/drawing/2014/main" id="{A8F7DA85-199D-9145-8069-BF1BBF863850}"/>
-                </a:ext>
-              </a:extLst>
-            </p:cNvPr>
-            <p:cNvSpPr/>
-            <p:nvPr/>
-          </p:nvSpPr>
-          <p:spPr>
-            <a:xfrm>
-              <a:off x="1001430" y="5029201"/>
-              <a:ext cx="5613683" cy="1174225"/>
-            </a:xfrm>
-            <a:prstGeom prst="rect">
-              <a:avLst/>
-            </a:prstGeom>
-            <a:solidFill>
-              <a:schemeClr val="accent4">
-                <a:alpha val="20000"/>
-              </a:schemeClr>
-            </a:solidFill>
-            <a:ln>
-              <a:noFill/>
-            </a:ln>
-          </p:spPr>
-          <p:style>
-            <a:lnRef idx="2">
-              <a:schemeClr val="accent1">
-                <a:shade val="50000"/>
-              </a:schemeClr>
-            </a:lnRef>
-            <a:fillRef idx="1">
-              <a:schemeClr val="accent1"/>
-            </a:fillRef>
-            <a:effectRef idx="0">
-              <a:schemeClr val="accent1"/>
-            </a:effectRef>
-            <a:fontRef idx="minor">
-              <a:schemeClr val="lt1"/>
-            </a:fontRef>
-          </p:style>
-          <p:txBody>
-            <a:bodyPr rot="0" spcFirstLastPara="0" vertOverflow="overflow" horzOverflow="overflow" vert="horz" wrap="square" lIns="68580" tIns="34290" rIns="68580" bIns="34290" numCol="1" spcCol="0" rtlCol="0" fromWordArt="0" anchor="ctr" anchorCtr="0" forceAA="0" compatLnSpc="1">
-              <a:prstTxWarp prst="textNoShape">
-                <a:avLst/>
-              </a:prstTxWarp>
-              <a:noAutofit/>
-            </a:bodyPr>
-            <a:lstStyle/>
-            <a:p>
-              <a:pPr algn="ctr"/>
-              <a:endParaRPr kumimoji="1" lang="ko-KR" altLang="en-US" sz="1013"/>
-            </a:p>
-          </p:txBody>
-        </p:sp>
-      </p:grpSp>
-      <p:pic>
-        <p:nvPicPr>
-          <p:cNvPr id="7" name="그림 6">
-            <a:extLst>
-              <a:ext uri="{FF2B5EF4-FFF2-40B4-BE49-F238E27FC236}">
-                <a16:creationId xmlns:a16="http://schemas.microsoft.com/office/drawing/2014/main" id="{F59F7322-E5DB-B04C-B08F-42E31FB6B248}"/>
+                <a16:creationId xmlns:a16="http://schemas.microsoft.com/office/drawing/2014/main" id="{9E23CC63-C675-E74B-8758-96CEEB7AE0CE}"/>
               </a:ext>
             </a:extLst>
           </p:cNvPr>
@@ -4383,15 +4301,15 @@
           <p:nvPr/>
         </p:nvPicPr>
         <p:blipFill>
-          <a:blip r:embed="rId3"/>
+          <a:blip r:embed="rId2"/>
           <a:stretch>
             <a:fillRect/>
           </a:stretch>
         </p:blipFill>
         <p:spPr>
           <a:xfrm>
-            <a:off x="4340929" y="2066039"/>
-            <a:ext cx="4432112" cy="2897011"/>
+            <a:off x="240415" y="1127392"/>
+            <a:ext cx="5042863" cy="4152946"/>
           </a:xfrm>
           <a:prstGeom prst="rect">
             <a:avLst/>
@@ -4403,98 +4321,12 @@
           </a:ln>
         </p:spPr>
       </p:pic>
-      <p:cxnSp>
-        <p:nvCxnSpPr>
-          <p:cNvPr id="8" name="직선 연결선[R] 7">
+      <p:sp>
+        <p:nvSpPr>
+          <p:cNvPr id="3" name="TextBox 2">
             <a:extLst>
               <a:ext uri="{FF2B5EF4-FFF2-40B4-BE49-F238E27FC236}">
-                <a16:creationId xmlns:a16="http://schemas.microsoft.com/office/drawing/2014/main" id="{85DAB48A-031C-FE41-A261-D4F1E54211AE}"/>
-              </a:ext>
-            </a:extLst>
-          </p:cNvPr>
-          <p:cNvCxnSpPr>
-            <a:cxnSpLocks/>
-          </p:cNvCxnSpPr>
-          <p:nvPr/>
-        </p:nvCxnSpPr>
-        <p:spPr>
-          <a:xfrm>
-            <a:off x="1539388" y="3122734"/>
-            <a:ext cx="1125140" cy="0"/>
-          </a:xfrm>
-          <a:prstGeom prst="line">
-            <a:avLst/>
-          </a:prstGeom>
-          <a:ln w="50800">
-            <a:solidFill>
-              <a:schemeClr val="accent4"/>
-            </a:solidFill>
-          </a:ln>
-        </p:spPr>
-        <p:style>
-          <a:lnRef idx="1">
-            <a:schemeClr val="accent1"/>
-          </a:lnRef>
-          <a:fillRef idx="0">
-            <a:schemeClr val="accent1"/>
-          </a:fillRef>
-          <a:effectRef idx="0">
-            <a:schemeClr val="accent1"/>
-          </a:effectRef>
-          <a:fontRef idx="minor">
-            <a:schemeClr val="tx1"/>
-          </a:fontRef>
-        </p:style>
-      </p:cxnSp>
-      <p:cxnSp>
-        <p:nvCxnSpPr>
-          <p:cNvPr id="9" name="직선 연결선[R] 8">
-            <a:extLst>
-              <a:ext uri="{FF2B5EF4-FFF2-40B4-BE49-F238E27FC236}">
-                <a16:creationId xmlns:a16="http://schemas.microsoft.com/office/drawing/2014/main" id="{BE777BCF-A999-D842-B506-0CFD3D6CCFDE}"/>
-              </a:ext>
-            </a:extLst>
-          </p:cNvPr>
-          <p:cNvCxnSpPr>
-            <a:cxnSpLocks/>
-          </p:cNvCxnSpPr>
-          <p:nvPr/>
-        </p:nvCxnSpPr>
-        <p:spPr>
-          <a:xfrm>
-            <a:off x="2676252" y="5607202"/>
-            <a:ext cx="1989535" cy="0"/>
-          </a:xfrm>
-          <a:prstGeom prst="line">
-            <a:avLst/>
-          </a:prstGeom>
-          <a:ln w="50800">
-            <a:solidFill>
-              <a:schemeClr val="accent4"/>
-            </a:solidFill>
-          </a:ln>
-        </p:spPr>
-        <p:style>
-          <a:lnRef idx="1">
-            <a:schemeClr val="accent1"/>
-          </a:lnRef>
-          <a:fillRef idx="0">
-            <a:schemeClr val="accent1"/>
-          </a:fillRef>
-          <a:effectRef idx="0">
-            <a:schemeClr val="accent1"/>
-          </a:effectRef>
-          <a:fontRef idx="minor">
-            <a:schemeClr val="tx1"/>
-          </a:fontRef>
-        </p:style>
-      </p:cxnSp>
-      <p:sp>
-        <p:nvSpPr>
-          <p:cNvPr id="11" name="TextBox 10">
-            <a:extLst>
-              <a:ext uri="{FF2B5EF4-FFF2-40B4-BE49-F238E27FC236}">
-                <a16:creationId xmlns:a16="http://schemas.microsoft.com/office/drawing/2014/main" id="{0AB60F80-B9D0-BE46-A546-CE79C4675B36}"/>
+                <a16:creationId xmlns:a16="http://schemas.microsoft.com/office/drawing/2014/main" id="{29DE516C-739A-9445-8331-23CF226B2BE3}"/>
               </a:ext>
             </a:extLst>
           </p:cNvPr>
@@ -4503,20 +4335,13 @@
         </p:nvSpPr>
         <p:spPr>
           <a:xfrm>
-            <a:off x="5043398" y="5347009"/>
-            <a:ext cx="3814763" cy="559961"/>
+            <a:off x="5486401" y="1127392"/>
+            <a:ext cx="3417184" cy="4278094"/>
           </a:xfrm>
           <a:prstGeom prst="rect">
             <a:avLst/>
           </a:prstGeom>
-          <a:solidFill>
-            <a:schemeClr val="bg1"/>
-          </a:solidFill>
-          <a:ln w="50800">
-            <a:solidFill>
-              <a:schemeClr val="accent2"/>
-            </a:solidFill>
-          </a:ln>
+          <a:noFill/>
         </p:spPr>
         <p:txBody>
           <a:bodyPr wrap="square" rtlCol="0">
@@ -4525,139 +4350,174 @@
           <a:lstStyle/>
           <a:p>
             <a:r>
-              <a:rPr kumimoji="1" lang="ko-KR" altLang="en-US" sz="1013" dirty="0"/>
-              <a:t>해당 </a:t>
-            </a:r>
-            <a:r>
-              <a:rPr kumimoji="1" lang="en-US" altLang="ko-KR" sz="1013" dirty="0" err="1"/>
-              <a:t>userID</a:t>
-            </a:r>
-            <a:r>
-              <a:rPr kumimoji="1" lang="ko-KR" altLang="en-US" sz="1013" dirty="0"/>
-              <a:t>에 해당되는 화학약품들의 전체 리스트를 얻기 위해선</a:t>
-            </a:r>
-            <a:r>
-              <a:rPr kumimoji="1" lang="en-US" altLang="ko-KR" sz="1013" dirty="0"/>
+              <a:rPr kumimoji="1" lang="en-US" altLang="ko-KR" sz="1600" dirty="0" err="1"/>
+              <a:t>CrudRepository</a:t>
+            </a:r>
+            <a:r>
+              <a:rPr kumimoji="1" lang="ko-KR" altLang="en-US" sz="1600" dirty="0"/>
+              <a:t> 인터페이스를 통해 데이터베이스의 모든 질의를 수행할 수 있다</a:t>
+            </a:r>
+            <a:r>
+              <a:rPr kumimoji="1" lang="en-US" altLang="ko-KR" sz="1600" dirty="0"/>
+              <a:t>.</a:t>
+            </a:r>
+            <a:r>
+              <a:rPr kumimoji="1" lang="ko-KR" altLang="en-US" sz="1600" dirty="0"/>
+              <a:t> </a:t>
+            </a:r>
+            <a:endParaRPr kumimoji="1" lang="en-US" altLang="ko-KR" sz="1600" dirty="0"/>
+          </a:p>
+          <a:p>
+            <a:endParaRPr kumimoji="1" lang="en-US" altLang="ko-KR" sz="1600" dirty="0"/>
+          </a:p>
+          <a:p>
+            <a:pPr marL="342900" indent="-342900">
+              <a:buAutoNum type="arabicPeriod"/>
+            </a:pPr>
+            <a:r>
+              <a:rPr kumimoji="1" lang="en-US" altLang="ko-KR" sz="1600" dirty="0"/>
+              <a:t>save, delete</a:t>
+            </a:r>
+            <a:r>
+              <a:rPr kumimoji="1" lang="ko-KR" altLang="en-US" sz="1600" dirty="0"/>
+              <a:t>와 같은 </a:t>
+            </a:r>
+            <a:r>
+              <a:rPr kumimoji="1" lang="ko-KR" altLang="en-US" sz="1600" dirty="0" err="1"/>
+              <a:t>메소드는</a:t>
+            </a:r>
+            <a:r>
+              <a:rPr kumimoji="1" lang="ko-KR" altLang="en-US" sz="1600" dirty="0"/>
+              <a:t> 이미 정의되어 있으므로</a:t>
+            </a:r>
+            <a:r>
+              <a:rPr kumimoji="1" lang="en-US" altLang="ko-KR" sz="1600" dirty="0"/>
               <a:t>,</a:t>
             </a:r>
             <a:r>
-              <a:rPr kumimoji="1" lang="ko-KR" altLang="en-US" sz="1013" dirty="0"/>
+              <a:rPr kumimoji="1" lang="ko-KR" altLang="en-US" sz="1600" dirty="0"/>
+              <a:t> 바로 사용 가능하다</a:t>
+            </a:r>
+            <a:endParaRPr kumimoji="1" lang="en-US" altLang="ko-KR" sz="1600" dirty="0"/>
+          </a:p>
+          <a:p>
+            <a:pPr marL="342900" indent="-342900">
+              <a:buAutoNum type="arabicPeriod"/>
+            </a:pPr>
+            <a:r>
+              <a:rPr kumimoji="1" lang="ko-KR" altLang="en-US" sz="1600" dirty="0"/>
+              <a:t>정해진 규칙에 따라 </a:t>
+            </a:r>
+            <a:r>
+              <a:rPr kumimoji="1" lang="ko-KR" altLang="en-US" sz="1600" dirty="0" err="1"/>
+              <a:t>메소드를</a:t>
+            </a:r>
+            <a:r>
+              <a:rPr kumimoji="1" lang="ko-KR" altLang="en-US" sz="1600" dirty="0"/>
+              <a:t> 정의만 해 주면</a:t>
+            </a:r>
+            <a:r>
+              <a:rPr kumimoji="1" lang="en-US" altLang="ko-KR" sz="1600" dirty="0"/>
+              <a:t>(</a:t>
+            </a:r>
+            <a:r>
+              <a:rPr kumimoji="1" lang="ko-KR" altLang="en-US" sz="1600" dirty="0"/>
+              <a:t>구현 안해도 됨</a:t>
+            </a:r>
+            <a:r>
+              <a:rPr kumimoji="1" lang="en-US" altLang="ko-KR" sz="1600" dirty="0"/>
+              <a:t>)</a:t>
+            </a:r>
+            <a:r>
+              <a:rPr kumimoji="1" lang="ko-KR" altLang="en-US" sz="1600" dirty="0"/>
+              <a:t> 쿼리를 작성 하지 않고도 모든 질의를 수행 가능하다</a:t>
+            </a:r>
+            <a:endParaRPr kumimoji="1" lang="en-US" altLang="ko-KR" sz="1600" dirty="0"/>
+          </a:p>
+          <a:p>
+            <a:pPr marL="342900" indent="-342900">
+              <a:buAutoNum type="arabicPeriod"/>
+            </a:pPr>
+            <a:r>
+              <a:rPr kumimoji="1" lang="ko-KR" altLang="en-US" sz="1600" dirty="0"/>
+              <a:t>예를 들어 </a:t>
+            </a:r>
+            <a:r>
+              <a:rPr kumimoji="1" lang="en-US" altLang="ko-KR" sz="1600" dirty="0" err="1"/>
+              <a:t>findByEmail</a:t>
+            </a:r>
+            <a:r>
+              <a:rPr kumimoji="1" lang="ko-KR" altLang="en-US" sz="1600" dirty="0"/>
+              <a:t>이라는 </a:t>
+            </a:r>
+            <a:r>
+              <a:rPr kumimoji="1" lang="ko-KR" altLang="en-US" sz="1600" dirty="0" err="1"/>
+              <a:t>메소드를</a:t>
+            </a:r>
+            <a:r>
+              <a:rPr kumimoji="1" lang="ko-KR" altLang="en-US" sz="1600" dirty="0"/>
+              <a:t> 정의 해 주면</a:t>
+            </a:r>
+            <a:r>
+              <a:rPr kumimoji="1" lang="en-US" altLang="ko-KR" sz="1600" dirty="0"/>
+              <a:t>,</a:t>
+            </a:r>
+            <a:r>
+              <a:rPr kumimoji="1" lang="ko-KR" altLang="en-US" sz="1600" dirty="0"/>
+              <a:t> 테이블의 속성 중 해당 </a:t>
+            </a:r>
+            <a:r>
+              <a:rPr kumimoji="1" lang="en-US" altLang="ko-KR" sz="1600" dirty="0"/>
+              <a:t>email</a:t>
+            </a:r>
+            <a:r>
+              <a:rPr kumimoji="1" lang="ko-KR" altLang="en-US" sz="1600" dirty="0"/>
+              <a:t> 값을 가지고 있는 </a:t>
+            </a:r>
+            <a:r>
+              <a:rPr kumimoji="1" lang="ko-KR" altLang="en-US" sz="1600" dirty="0" err="1"/>
+              <a:t>튜플을</a:t>
+            </a:r>
+            <a:r>
+              <a:rPr kumimoji="1" lang="ko-KR" altLang="en-US" sz="1600" dirty="0"/>
               <a:t> </a:t>
             </a:r>
             <a:r>
-              <a:rPr kumimoji="1" lang="en-US" altLang="ko-KR" sz="1013" dirty="0" err="1"/>
-              <a:t>UserEntity</a:t>
-            </a:r>
-            <a:r>
-              <a:rPr kumimoji="1" lang="ko-KR" altLang="en-US" sz="1013" dirty="0"/>
-              <a:t>의 </a:t>
-            </a:r>
-            <a:r>
-              <a:rPr kumimoji="1" lang="en-US" altLang="ko-KR" sz="1013" dirty="0"/>
-              <a:t>chemicals</a:t>
-            </a:r>
-            <a:r>
-              <a:rPr kumimoji="1" lang="ko-KR" altLang="en-US" sz="1013" dirty="0" err="1"/>
-              <a:t>를</a:t>
-            </a:r>
-            <a:r>
-              <a:rPr kumimoji="1" lang="ko-KR" altLang="en-US" sz="1013" dirty="0"/>
+              <a:rPr kumimoji="1" lang="ko-KR" altLang="en-US" sz="1600" dirty="0" err="1"/>
+              <a:t>리턴해준다</a:t>
+            </a:r>
+            <a:r>
+              <a:rPr kumimoji="1" lang="ko-KR" altLang="en-US" sz="1600" dirty="0"/>
               <a:t> </a:t>
             </a:r>
             <a:r>
-              <a:rPr kumimoji="1" lang="ko-KR" altLang="en-US" sz="1013" dirty="0" err="1"/>
-              <a:t>리턴해주면</a:t>
-            </a:r>
-            <a:r>
-              <a:rPr kumimoji="1" lang="ko-KR" altLang="en-US" sz="1013" dirty="0"/>
-              <a:t> 됨</a:t>
-            </a:r>
-            <a:r>
-              <a:rPr kumimoji="1" lang="en-US" altLang="ko-KR" sz="1013" dirty="0"/>
-              <a:t>.</a:t>
-            </a:r>
-            <a:r>
-              <a:rPr kumimoji="1" lang="ko-KR" altLang="en-US" sz="1013" dirty="0"/>
-              <a:t> </a:t>
-            </a:r>
-            <a:r>
-              <a:rPr kumimoji="1" lang="en-US" altLang="ko-KR" sz="1013" dirty="0" err="1"/>
-              <a:t>UserEntity</a:t>
-            </a:r>
-            <a:r>
-              <a:rPr kumimoji="1" lang="ko-KR" altLang="en-US" sz="1013" dirty="0" err="1"/>
-              <a:t>를</a:t>
-            </a:r>
-            <a:r>
-              <a:rPr kumimoji="1" lang="ko-KR" altLang="en-US" sz="1013" dirty="0"/>
-              <a:t> 얻기 위해 </a:t>
-            </a:r>
-            <a:r>
-              <a:rPr kumimoji="1" lang="en-US" altLang="ko-KR" sz="1013" dirty="0" err="1"/>
-              <a:t>UserRepository</a:t>
-            </a:r>
-            <a:r>
-              <a:rPr kumimoji="1" lang="ko-KR" altLang="en-US" sz="1013" dirty="0"/>
-              <a:t>의 </a:t>
-            </a:r>
-            <a:r>
-              <a:rPr kumimoji="1" lang="en-US" altLang="ko-KR" sz="1013" dirty="0" err="1"/>
-              <a:t>findByID</a:t>
-            </a:r>
-            <a:r>
-              <a:rPr kumimoji="1" lang="ko-KR" altLang="en-US" sz="1013" dirty="0"/>
-              <a:t> </a:t>
-            </a:r>
-            <a:r>
-              <a:rPr kumimoji="1" lang="ko-KR" altLang="en-US" sz="1013" dirty="0" err="1"/>
-              <a:t>메소드</a:t>
-            </a:r>
-            <a:r>
-              <a:rPr kumimoji="1" lang="ko-KR" altLang="en-US" sz="1013" dirty="0"/>
-              <a:t> 호출</a:t>
-            </a:r>
-          </a:p>
-        </p:txBody>
-      </p:sp>
-      <p:pic>
-        <p:nvPicPr>
-          <p:cNvPr id="12" name="그림 11">
-            <a:extLst>
-              <a:ext uri="{FF2B5EF4-FFF2-40B4-BE49-F238E27FC236}">
-                <a16:creationId xmlns:a16="http://schemas.microsoft.com/office/drawing/2014/main" id="{68207CE6-F3C5-FF4B-92A0-B9652EAF61A1}"/>
-              </a:ext>
-            </a:extLst>
-          </p:cNvPr>
-          <p:cNvPicPr>
-            <a:picLocks noChangeAspect="1"/>
-          </p:cNvPicPr>
-          <p:nvPr/>
-        </p:nvPicPr>
-        <p:blipFill>
-          <a:blip r:embed="rId4"/>
-          <a:stretch>
-            <a:fillRect/>
-          </a:stretch>
-        </p:blipFill>
-        <p:spPr>
-          <a:xfrm>
-            <a:off x="1363731" y="1016206"/>
-            <a:ext cx="2797956" cy="1811732"/>
-          </a:xfrm>
-          <a:prstGeom prst="rect">
-            <a:avLst/>
-          </a:prstGeom>
-          <a:ln w="50800">
-            <a:solidFill>
-              <a:schemeClr val="accent4"/>
-            </a:solidFill>
-          </a:ln>
-        </p:spPr>
-      </p:pic>
+              <a:rPr kumimoji="1" lang="en-US" altLang="ko-KR" sz="1600" dirty="0"/>
+              <a:t>(</a:t>
+            </a:r>
+            <a:r>
+              <a:rPr kumimoji="1" lang="ko-KR" altLang="en-US" sz="1600" dirty="0"/>
+              <a:t>매개변수와 결과값 모두 </a:t>
+            </a:r>
+            <a:r>
+              <a:rPr kumimoji="1" lang="en-US" altLang="ko-KR" sz="1600" dirty="0"/>
+              <a:t>entity class</a:t>
+            </a:r>
+            <a:r>
+              <a:rPr kumimoji="1" lang="ko-KR" altLang="en-US" sz="1600" dirty="0"/>
+              <a:t>의 인스턴스</a:t>
+            </a:r>
+            <a:r>
+              <a:rPr kumimoji="1" lang="en-US" altLang="ko-KR" sz="1600" dirty="0"/>
+              <a:t>)</a:t>
+            </a:r>
+            <a:endParaRPr kumimoji="1" lang="ko-KR" altLang="en-US" sz="1600" dirty="0"/>
+          </a:p>
+        </p:txBody>
+      </p:sp>
     </p:spTree>
     <p:extLst>
       <p:ext uri="{BB962C8B-B14F-4D97-AF65-F5344CB8AC3E}">
-        <p14:creationId xmlns:p14="http://schemas.microsoft.com/office/powerpoint/2010/main" val="3750614028"/>
+        <p14:creationId xmlns:p14="http://schemas.microsoft.com/office/powerpoint/2010/main" val="2043669445"/>
       </p:ext>
     </p:extLst>
   </p:cSld>
@@ -4684,71 +4544,40 @@
           <a:chExt cx="0" cy="0"/>
         </a:xfrm>
       </p:grpSpPr>
-      <p:pic>
-        <p:nvPicPr>
-          <p:cNvPr id="7" name="그림 6">
+      <p:sp>
+        <p:nvSpPr>
+          <p:cNvPr id="2" name="제목 1">
             <a:extLst>
               <a:ext uri="{FF2B5EF4-FFF2-40B4-BE49-F238E27FC236}">
-                <a16:creationId xmlns:a16="http://schemas.microsoft.com/office/drawing/2014/main" id="{928CB46D-EECE-A749-8177-FD28EEC5CFCD}"/>
+                <a16:creationId xmlns:a16="http://schemas.microsoft.com/office/drawing/2014/main" id="{71A634B0-4382-E443-931E-5EFE3752A49F}"/>
               </a:ext>
             </a:extLst>
           </p:cNvPr>
-          <p:cNvPicPr>
-            <a:picLocks noChangeAspect="1"/>
-          </p:cNvPicPr>
-          <p:nvPr/>
-        </p:nvPicPr>
-        <p:blipFill>
-          <a:blip r:embed="rId2"/>
-          <a:stretch>
-            <a:fillRect/>
-          </a:stretch>
-        </p:blipFill>
-        <p:spPr>
-          <a:xfrm>
-            <a:off x="628650" y="2280506"/>
-            <a:ext cx="5124450" cy="838200"/>
-          </a:xfrm>
-          <a:prstGeom prst="rect">
-            <a:avLst/>
-          </a:prstGeom>
-        </p:spPr>
-      </p:pic>
-      <p:sp>
-        <p:nvSpPr>
-          <p:cNvPr id="2" name="제목 1">
+          <p:cNvSpPr>
+            <a:spLocks noGrp="1"/>
+          </p:cNvSpPr>
+          <p:nvPr>
+            <p:ph type="title"/>
+          </p:nvPr>
+        </p:nvSpPr>
+        <p:spPr/>
+        <p:txBody>
+          <a:bodyPr/>
+          <a:lstStyle/>
+          <a:p>
+            <a:r>
+              <a:rPr kumimoji="1" lang="ko-KR" altLang="en-US" dirty="0"/>
+              <a:t>화학 약품 리스트 불러오기</a:t>
+            </a:r>
+          </a:p>
+        </p:txBody>
+      </p:sp>
+      <p:pic>
+        <p:nvPicPr>
+          <p:cNvPr id="3" name="그림 2">
             <a:extLst>
               <a:ext uri="{FF2B5EF4-FFF2-40B4-BE49-F238E27FC236}">
-                <a16:creationId xmlns:a16="http://schemas.microsoft.com/office/drawing/2014/main" id="{8E1CFC23-DBDA-5342-B55D-6BDE531DAEDB}"/>
-              </a:ext>
-            </a:extLst>
-          </p:cNvPr>
-          <p:cNvSpPr>
-            <a:spLocks noGrp="1"/>
-          </p:cNvSpPr>
-          <p:nvPr>
-            <p:ph type="title"/>
-          </p:nvPr>
-        </p:nvSpPr>
-        <p:spPr/>
-        <p:txBody>
-          <a:bodyPr/>
-          <a:lstStyle/>
-          <a:p>
-            <a:r>
-              <a:rPr kumimoji="1" lang="en-US" altLang="ko-KR" dirty="0"/>
-              <a:t>Implementation</a:t>
-            </a:r>
-            <a:endParaRPr kumimoji="1" lang="ko-KR" altLang="en-US" dirty="0"/>
-          </a:p>
-        </p:txBody>
-      </p:sp>
-      <p:pic>
-        <p:nvPicPr>
-          <p:cNvPr id="5" name="그림 4">
-            <a:extLst>
-              <a:ext uri="{FF2B5EF4-FFF2-40B4-BE49-F238E27FC236}">
-                <a16:creationId xmlns:a16="http://schemas.microsoft.com/office/drawing/2014/main" id="{9E23CC63-C675-E74B-8758-96CEEB7AE0CE}"/>
+                <a16:creationId xmlns:a16="http://schemas.microsoft.com/office/drawing/2014/main" id="{6E1384FF-793E-754E-BB0D-003C56E51E72}"/>
               </a:ext>
             </a:extLst>
           </p:cNvPr>
@@ -4765,220 +4594,18 @@
         </p:blipFill>
         <p:spPr>
           <a:xfrm>
-            <a:off x="5397104" y="2863066"/>
-            <a:ext cx="3273028" cy="2695435"/>
+            <a:off x="458952" y="1714794"/>
+            <a:ext cx="8226096" cy="3428411"/>
           </a:xfrm>
           <a:prstGeom prst="rect">
             <a:avLst/>
           </a:prstGeom>
-          <a:ln w="50800">
-            <a:solidFill>
-              <a:schemeClr val="accent4"/>
-            </a:solidFill>
-          </a:ln>
         </p:spPr>
       </p:pic>
-      <p:sp>
-        <p:nvSpPr>
-          <p:cNvPr id="6" name="TextBox 5">
-            <a:extLst>
-              <a:ext uri="{FF2B5EF4-FFF2-40B4-BE49-F238E27FC236}">
-                <a16:creationId xmlns:a16="http://schemas.microsoft.com/office/drawing/2014/main" id="{4E268DC1-B585-EA48-8DE3-21EAF4BC9233}"/>
-              </a:ext>
-            </a:extLst>
-          </p:cNvPr>
-          <p:cNvSpPr txBox="1"/>
-          <p:nvPr/>
-        </p:nvSpPr>
-        <p:spPr>
-          <a:xfrm>
-            <a:off x="157163" y="3739296"/>
-            <a:ext cx="5125641" cy="1183466"/>
-          </a:xfrm>
-          <a:prstGeom prst="rect">
-            <a:avLst/>
-          </a:prstGeom>
-          <a:noFill/>
-          <a:ln w="50800">
-            <a:solidFill>
-              <a:schemeClr val="accent2"/>
-            </a:solidFill>
-          </a:ln>
-        </p:spPr>
-        <p:txBody>
-          <a:bodyPr wrap="square" rtlCol="0">
-            <a:spAutoFit/>
-          </a:bodyPr>
-          <a:lstStyle/>
-          <a:p>
-            <a:r>
-              <a:rPr kumimoji="1" lang="ko-KR" altLang="en-US" sz="1013" dirty="0"/>
-              <a:t>원하는 </a:t>
-            </a:r>
-            <a:r>
-              <a:rPr kumimoji="1" lang="en-US" altLang="ko-KR" sz="1013" dirty="0"/>
-              <a:t>Attribute</a:t>
-            </a:r>
-            <a:r>
-              <a:rPr kumimoji="1" lang="ko-KR" altLang="en-US" sz="1013" dirty="0" err="1"/>
-              <a:t>를</a:t>
-            </a:r>
-            <a:r>
-              <a:rPr kumimoji="1" lang="ko-KR" altLang="en-US" sz="1013" dirty="0"/>
-              <a:t> 대상으로 </a:t>
-            </a:r>
-            <a:r>
-              <a:rPr kumimoji="1" lang="en-US" altLang="ko-KR" sz="1013" dirty="0"/>
-              <a:t>CRUD</a:t>
-            </a:r>
-            <a:r>
-              <a:rPr kumimoji="1" lang="ko-KR" altLang="en-US" sz="1013" dirty="0"/>
-              <a:t> 연산 정의 가능</a:t>
-            </a:r>
-            <a:endParaRPr kumimoji="1" lang="en-US" altLang="ko-KR" sz="1013" dirty="0"/>
-          </a:p>
-          <a:p>
-            <a:r>
-              <a:rPr kumimoji="1" lang="ko-KR" altLang="en-US" sz="1013" dirty="0" err="1"/>
-              <a:t>예를들어</a:t>
-            </a:r>
-            <a:r>
-              <a:rPr kumimoji="1" lang="ko-KR" altLang="en-US" sz="1013" dirty="0"/>
-              <a:t> </a:t>
-            </a:r>
-            <a:r>
-              <a:rPr kumimoji="1" lang="en-US" altLang="ko-KR" sz="1013" dirty="0" err="1"/>
-              <a:t>findByEmail</a:t>
-            </a:r>
-            <a:r>
-              <a:rPr kumimoji="1" lang="en-US" altLang="ko-KR" sz="1013" dirty="0"/>
-              <a:t>(email)</a:t>
-            </a:r>
-            <a:r>
-              <a:rPr kumimoji="1" lang="ko-KR" altLang="en-US" sz="1013" dirty="0"/>
-              <a:t>은 </a:t>
-            </a:r>
-            <a:r>
-              <a:rPr kumimoji="1" lang="en-US" altLang="ko-KR" sz="1013" dirty="0"/>
-              <a:t>parameter</a:t>
-            </a:r>
-            <a:r>
-              <a:rPr kumimoji="1" lang="ko-KR" altLang="en-US" sz="1013" dirty="0"/>
-              <a:t>의 </a:t>
-            </a:r>
-            <a:r>
-              <a:rPr kumimoji="1" lang="en-US" altLang="ko-KR" sz="1013" dirty="0"/>
-              <a:t>email</a:t>
-            </a:r>
-            <a:r>
-              <a:rPr kumimoji="1" lang="ko-KR" altLang="en-US" sz="1013" dirty="0"/>
-              <a:t>에 해당하는 </a:t>
-            </a:r>
-            <a:r>
-              <a:rPr kumimoji="1" lang="en-US" altLang="ko-KR" sz="1013" dirty="0"/>
-              <a:t>User </a:t>
-            </a:r>
-            <a:r>
-              <a:rPr kumimoji="1" lang="ko-KR" altLang="en-US" sz="1013" dirty="0"/>
-              <a:t>테이블의 값을 찾아서 </a:t>
-            </a:r>
-            <a:r>
-              <a:rPr kumimoji="1" lang="en-US" altLang="ko-KR" sz="1013" dirty="0" err="1"/>
-              <a:t>UserEntity</a:t>
-            </a:r>
-            <a:r>
-              <a:rPr kumimoji="1" lang="ko-KR" altLang="en-US" sz="1013" dirty="0"/>
-              <a:t>에 </a:t>
-            </a:r>
-            <a:r>
-              <a:rPr kumimoji="1" lang="ko-KR" altLang="en-US" sz="1013" dirty="0" err="1"/>
-              <a:t>매핑시켜준</a:t>
-            </a:r>
-            <a:r>
-              <a:rPr kumimoji="1" lang="ko-KR" altLang="en-US" sz="1013" dirty="0"/>
-              <a:t> 후</a:t>
-            </a:r>
-            <a:endParaRPr kumimoji="1" lang="en-US" altLang="ko-KR" sz="1013" dirty="0"/>
-          </a:p>
-          <a:p>
-            <a:r>
-              <a:rPr kumimoji="1" lang="ko-KR" altLang="en-US" sz="1013" dirty="0"/>
-              <a:t>그 인스턴스를 </a:t>
-            </a:r>
-            <a:r>
-              <a:rPr kumimoji="1" lang="ko-KR" altLang="en-US" sz="1013" dirty="0" err="1"/>
-              <a:t>리턴해주는</a:t>
-            </a:r>
-            <a:r>
-              <a:rPr kumimoji="1" lang="ko-KR" altLang="en-US" sz="1013" dirty="0"/>
-              <a:t> </a:t>
-            </a:r>
-            <a:r>
-              <a:rPr kumimoji="1" lang="ko-KR" altLang="en-US" sz="1013" dirty="0" err="1"/>
-              <a:t>메소드</a:t>
-            </a:r>
-            <a:endParaRPr kumimoji="1" lang="en-US" altLang="ko-KR" sz="1013" dirty="0"/>
-          </a:p>
-          <a:p>
-            <a:r>
-              <a:rPr kumimoji="1" lang="en-US" altLang="ko-KR" sz="1013" dirty="0"/>
-              <a:t>-&gt;</a:t>
-            </a:r>
-            <a:r>
-              <a:rPr kumimoji="1" lang="ko-KR" altLang="en-US" sz="1013" dirty="0"/>
-              <a:t> 즉 </a:t>
-            </a:r>
-            <a:r>
-              <a:rPr kumimoji="1" lang="en-US" altLang="ko-KR" sz="1013" dirty="0" err="1"/>
-              <a:t>UserRepository</a:t>
-            </a:r>
-            <a:r>
-              <a:rPr kumimoji="1" lang="ko-KR" altLang="en-US" sz="1013" dirty="0"/>
-              <a:t>에 </a:t>
-            </a:r>
-            <a:r>
-              <a:rPr kumimoji="1" lang="en-US" altLang="ko-KR" sz="1013" dirty="0"/>
-              <a:t>User </a:t>
-            </a:r>
-            <a:r>
-              <a:rPr kumimoji="1" lang="en-US" altLang="ko-KR" sz="1013" dirty="0" err="1"/>
-              <a:t>findById</a:t>
-            </a:r>
-            <a:r>
-              <a:rPr kumimoji="1" lang="en-US" altLang="ko-KR" sz="1013" dirty="0"/>
-              <a:t>(int id)</a:t>
-            </a:r>
-            <a:r>
-              <a:rPr kumimoji="1" lang="ko-KR" altLang="en-US" sz="1013" dirty="0"/>
-              <a:t>라는 </a:t>
-            </a:r>
-            <a:r>
-              <a:rPr kumimoji="1" lang="ko-KR" altLang="en-US" sz="1013" dirty="0" err="1"/>
-              <a:t>메소드만</a:t>
-            </a:r>
-            <a:r>
-              <a:rPr kumimoji="1" lang="ko-KR" altLang="en-US" sz="1013" dirty="0"/>
-              <a:t> 선언 해주면</a:t>
-            </a:r>
-            <a:r>
-              <a:rPr kumimoji="1" lang="en-US" altLang="ko-KR" sz="1013" dirty="0"/>
-              <a:t>,</a:t>
-            </a:r>
-            <a:r>
-              <a:rPr kumimoji="1" lang="ko-KR" altLang="en-US" sz="1013" dirty="0"/>
-              <a:t> 구현은 해주지 않아도 자동으로 데이터베이스 쿼리를 날려줄 수 있음</a:t>
-            </a:r>
-            <a:endParaRPr kumimoji="1" lang="en-US" altLang="ko-KR" sz="1013" dirty="0"/>
-          </a:p>
-          <a:p>
-            <a:endParaRPr kumimoji="1" lang="ko-KR" altLang="en-US" sz="1013" dirty="0"/>
-          </a:p>
-        </p:txBody>
-      </p:sp>
     </p:spTree>
     <p:extLst>
       <p:ext uri="{BB962C8B-B14F-4D97-AF65-F5344CB8AC3E}">
-        <p14:creationId xmlns:p14="http://schemas.microsoft.com/office/powerpoint/2010/main" val="2043669445"/>
+        <p14:creationId xmlns:p14="http://schemas.microsoft.com/office/powerpoint/2010/main" val="1806141719"/>
       </p:ext>
     </p:extLst>
   </p:cSld>
@@ -5010,7 +4637,7 @@
           <p:cNvPr id="2" name="제목 1">
             <a:extLst>
               <a:ext uri="{FF2B5EF4-FFF2-40B4-BE49-F238E27FC236}">
-                <a16:creationId xmlns:a16="http://schemas.microsoft.com/office/drawing/2014/main" id="{AF8E3368-7AEF-934F-AE87-79AE0466FE76}"/>
+                <a16:creationId xmlns:a16="http://schemas.microsoft.com/office/drawing/2014/main" id="{1A5FCD13-6A96-A044-BF40-94A3BBCE5910}"/>
               </a:ext>
             </a:extLst>
           </p:cNvPr>
@@ -5027,97 +4654,243 @@
           <a:lstStyle/>
           <a:p>
             <a:r>
-              <a:rPr kumimoji="1" lang="ko-KR" altLang="en-US" dirty="0"/>
-              <a:t>화학 약품 추가하기</a:t>
-            </a:r>
-          </a:p>
-        </p:txBody>
-      </p:sp>
-      <p:grpSp>
-        <p:nvGrpSpPr>
-          <p:cNvPr id="6" name="그룹 5">
+              <a:rPr kumimoji="1" lang="en-US" altLang="ko-KR" dirty="0"/>
+              <a:t>Implementation</a:t>
+            </a:r>
+            <a:endParaRPr kumimoji="1" lang="ko-KR" altLang="en-US" dirty="0"/>
+          </a:p>
+        </p:txBody>
+      </p:sp>
+      <p:pic>
+        <p:nvPicPr>
+          <p:cNvPr id="4" name="그림 3">
             <a:extLst>
               <a:ext uri="{FF2B5EF4-FFF2-40B4-BE49-F238E27FC236}">
-                <a16:creationId xmlns:a16="http://schemas.microsoft.com/office/drawing/2014/main" id="{65203CA2-8C81-D044-8E26-77225C56FE3C}"/>
+                <a16:creationId xmlns:a16="http://schemas.microsoft.com/office/drawing/2014/main" id="{9A70D90E-C30E-AD4D-93BB-18DD14B882BB}"/>
               </a:ext>
             </a:extLst>
           </p:cNvPr>
-          <p:cNvGrpSpPr/>
+          <p:cNvPicPr>
+            <a:picLocks noChangeAspect="1"/>
+          </p:cNvPicPr>
           <p:nvPr/>
-        </p:nvGrpSpPr>
-        <p:grpSpPr>
+        </p:nvPicPr>
+        <p:blipFill>
+          <a:blip r:embed="rId2"/>
+          <a:stretch>
+            <a:fillRect/>
+          </a:stretch>
+        </p:blipFill>
+        <p:spPr>
           <a:xfrm>
-            <a:off x="982562" y="1497440"/>
-            <a:ext cx="7178875" cy="4221956"/>
-            <a:chOff x="752473" y="898525"/>
-            <a:chExt cx="9647240" cy="5949065"/>
+            <a:off x="812800" y="1479728"/>
+            <a:ext cx="7518400" cy="2095500"/>
           </a:xfrm>
-        </p:grpSpPr>
-        <p:pic>
-          <p:nvPicPr>
-            <p:cNvPr id="4" name="그림 3">
-              <a:extLst>
-                <a:ext uri="{FF2B5EF4-FFF2-40B4-BE49-F238E27FC236}">
-                  <a16:creationId xmlns:a16="http://schemas.microsoft.com/office/drawing/2014/main" id="{53E110CC-71EB-3B47-8604-739F87FE1B28}"/>
-                </a:ext>
-              </a:extLst>
-            </p:cNvPr>
-            <p:cNvPicPr>
-              <a:picLocks noChangeAspect="1"/>
-            </p:cNvPicPr>
-            <p:nvPr/>
-          </p:nvPicPr>
-          <p:blipFill>
-            <a:blip r:embed="rId2"/>
-            <a:stretch>
-              <a:fillRect/>
-            </a:stretch>
-          </p:blipFill>
-          <p:spPr>
-            <a:xfrm>
-              <a:off x="752473" y="898525"/>
-              <a:ext cx="9534528" cy="927100"/>
-            </a:xfrm>
-            <a:prstGeom prst="rect">
-              <a:avLst/>
-            </a:prstGeom>
-          </p:spPr>
-        </p:pic>
-        <p:pic>
-          <p:nvPicPr>
-            <p:cNvPr id="5" name="그림 4">
-              <a:extLst>
-                <a:ext uri="{FF2B5EF4-FFF2-40B4-BE49-F238E27FC236}">
-                  <a16:creationId xmlns:a16="http://schemas.microsoft.com/office/drawing/2014/main" id="{CA00DB65-E9A7-3148-92D3-DE6830558F02}"/>
-                </a:ext>
-              </a:extLst>
-            </p:cNvPr>
-            <p:cNvPicPr>
-              <a:picLocks noChangeAspect="1"/>
-            </p:cNvPicPr>
-            <p:nvPr/>
-          </p:nvPicPr>
-          <p:blipFill>
-            <a:blip r:embed="rId3"/>
-            <a:stretch>
-              <a:fillRect/>
-            </a:stretch>
-          </p:blipFill>
-          <p:spPr>
-            <a:xfrm>
-              <a:off x="1028701" y="1825625"/>
-              <a:ext cx="9371012" cy="5021965"/>
-            </a:xfrm>
-            <a:prstGeom prst="rect">
-              <a:avLst/>
-            </a:prstGeom>
-          </p:spPr>
-        </p:pic>
-      </p:grpSp>
+          <a:prstGeom prst="rect">
+            <a:avLst/>
+          </a:prstGeom>
+          <a:ln w="50800">
+            <a:solidFill>
+              <a:schemeClr val="accent4"/>
+            </a:solidFill>
+          </a:ln>
+        </p:spPr>
+      </p:pic>
+      <p:sp>
+        <p:nvSpPr>
+          <p:cNvPr id="7" name="TextBox 6">
+            <a:extLst>
+              <a:ext uri="{FF2B5EF4-FFF2-40B4-BE49-F238E27FC236}">
+                <a16:creationId xmlns:a16="http://schemas.microsoft.com/office/drawing/2014/main" id="{CF507A33-7FC5-C84E-9CBF-EA3A931DCB41}"/>
+              </a:ext>
+            </a:extLst>
+          </p:cNvPr>
+          <p:cNvSpPr txBox="1"/>
+          <p:nvPr/>
+        </p:nvSpPr>
+        <p:spPr>
+          <a:xfrm>
+            <a:off x="628650" y="3902300"/>
+            <a:ext cx="7886700" cy="1754326"/>
+          </a:xfrm>
+          <a:prstGeom prst="rect">
+            <a:avLst/>
+          </a:prstGeom>
+          <a:noFill/>
+        </p:spPr>
+        <p:txBody>
+          <a:bodyPr wrap="square" rtlCol="0">
+            <a:spAutoFit/>
+          </a:bodyPr>
+          <a:lstStyle/>
+          <a:p>
+            <a:pPr marL="342900" indent="-342900">
+              <a:buFont typeface="+mj-lt"/>
+              <a:buAutoNum type="arabicPeriod"/>
+            </a:pPr>
+            <a:r>
+              <a:rPr kumimoji="1" lang="ko-KR" altLang="en-US" dirty="0"/>
+              <a:t>요청과 함께 해당 유저의 </a:t>
+            </a:r>
+            <a:r>
+              <a:rPr kumimoji="1" lang="en-US" altLang="ko-KR" dirty="0"/>
+              <a:t>id(</a:t>
+            </a:r>
+            <a:r>
+              <a:rPr kumimoji="1" lang="en-US" altLang="ko-KR" dirty="0" err="1"/>
+              <a:t>userID</a:t>
+            </a:r>
+            <a:r>
+              <a:rPr kumimoji="1" lang="en-US" altLang="ko-KR" dirty="0"/>
+              <a:t>)</a:t>
+            </a:r>
+            <a:r>
+              <a:rPr kumimoji="1" lang="ko-KR" altLang="en-US" dirty="0" err="1"/>
+              <a:t>를</a:t>
+            </a:r>
+            <a:r>
+              <a:rPr kumimoji="1" lang="ko-KR" altLang="en-US" dirty="0"/>
+              <a:t> 받는다</a:t>
+            </a:r>
+            <a:endParaRPr kumimoji="1" lang="en-US" altLang="ko-KR" dirty="0"/>
+          </a:p>
+          <a:p>
+            <a:pPr marL="342900" indent="-342900">
+              <a:buFont typeface="+mj-lt"/>
+              <a:buAutoNum type="arabicPeriod"/>
+            </a:pPr>
+            <a:r>
+              <a:rPr kumimoji="1" lang="en-US" altLang="ko-KR" dirty="0" err="1"/>
+              <a:t>userRepository</a:t>
+            </a:r>
+            <a:r>
+              <a:rPr kumimoji="1" lang="ko-KR" altLang="en-US" dirty="0"/>
+              <a:t>의 </a:t>
+            </a:r>
+            <a:r>
+              <a:rPr kumimoji="1" lang="en-US" altLang="ko-KR" dirty="0" err="1"/>
+              <a:t>findByID</a:t>
+            </a:r>
+            <a:r>
+              <a:rPr kumimoji="1" lang="ko-KR" altLang="en-US" dirty="0"/>
+              <a:t> </a:t>
+            </a:r>
+            <a:r>
+              <a:rPr kumimoji="1" lang="ko-KR" altLang="en-US" dirty="0" err="1"/>
+              <a:t>메소드를</a:t>
+            </a:r>
+            <a:r>
+              <a:rPr kumimoji="1" lang="ko-KR" altLang="en-US" dirty="0"/>
+              <a:t> 호출해 해당 유저의 </a:t>
+            </a:r>
+            <a:r>
+              <a:rPr kumimoji="1" lang="en-US" altLang="ko-KR" dirty="0"/>
+              <a:t>User </a:t>
+            </a:r>
+            <a:r>
+              <a:rPr kumimoji="1" lang="ko-KR" altLang="en-US" dirty="0"/>
+              <a:t>클래스 인스턴스를 </a:t>
+            </a:r>
+            <a:r>
+              <a:rPr kumimoji="1" lang="ko-KR" altLang="en-US" dirty="0" err="1"/>
+              <a:t>리턴받는다</a:t>
+            </a:r>
+            <a:r>
+              <a:rPr kumimoji="1" lang="en-US" altLang="ko-KR" dirty="0"/>
+              <a:t>.</a:t>
+            </a:r>
+            <a:r>
+              <a:rPr kumimoji="1" lang="ko-KR" altLang="en-US" dirty="0"/>
+              <a:t> </a:t>
+            </a:r>
+            <a:endParaRPr kumimoji="1" lang="en-US" altLang="ko-KR" dirty="0"/>
+          </a:p>
+          <a:p>
+            <a:pPr marL="342900" indent="-342900">
+              <a:buFont typeface="+mj-lt"/>
+              <a:buAutoNum type="arabicPeriod"/>
+            </a:pPr>
+            <a:r>
+              <a:rPr kumimoji="1" lang="en-US" altLang="ko-KR" dirty="0"/>
+              <a:t>user </a:t>
+            </a:r>
+            <a:r>
+              <a:rPr kumimoji="1" lang="ko-KR" altLang="en-US" dirty="0"/>
+              <a:t>인스턴스 안에는 </a:t>
+            </a:r>
+            <a:r>
+              <a:rPr kumimoji="1" lang="en-US" altLang="ko-KR" dirty="0"/>
+              <a:t>chemicals</a:t>
+            </a:r>
+            <a:r>
+              <a:rPr kumimoji="1" lang="ko-KR" altLang="en-US" dirty="0"/>
+              <a:t>라는 속성으로 유저가 추가한 모든 화학약품들의 리스트가 존재한다</a:t>
+            </a:r>
+            <a:r>
+              <a:rPr kumimoji="1" lang="en-US" altLang="ko-KR" dirty="0"/>
+              <a:t>.</a:t>
+            </a:r>
+            <a:r>
+              <a:rPr kumimoji="1" lang="ko-KR" altLang="en-US" dirty="0"/>
+              <a:t> </a:t>
+            </a:r>
+            <a:r>
+              <a:rPr kumimoji="1" lang="en-US" altLang="ko-KR" dirty="0"/>
+              <a:t>(Chemical</a:t>
+            </a:r>
+            <a:r>
+              <a:rPr kumimoji="1" lang="ko-KR" altLang="en-US" dirty="0"/>
+              <a:t> 클래스의 리스트</a:t>
+            </a:r>
+            <a:r>
+              <a:rPr kumimoji="1" lang="en-US" altLang="ko-KR" dirty="0"/>
+              <a:t>)</a:t>
+            </a:r>
+          </a:p>
+          <a:p>
+            <a:pPr marL="342900" indent="-342900">
+              <a:buFont typeface="+mj-lt"/>
+              <a:buAutoNum type="arabicPeriod"/>
+            </a:pPr>
+            <a:r>
+              <a:rPr kumimoji="1" lang="en-US" altLang="ko-KR" dirty="0"/>
+              <a:t>getter</a:t>
+            </a:r>
+            <a:r>
+              <a:rPr kumimoji="1" lang="ko-KR" altLang="en-US" dirty="0" err="1"/>
+              <a:t>를</a:t>
+            </a:r>
+            <a:r>
+              <a:rPr kumimoji="1" lang="ko-KR" altLang="en-US" dirty="0"/>
+              <a:t> 통해 </a:t>
+            </a:r>
+            <a:r>
+              <a:rPr kumimoji="1" lang="en-US" altLang="ko-KR" dirty="0"/>
+              <a:t>chemicals</a:t>
+            </a:r>
+            <a:r>
+              <a:rPr kumimoji="1" lang="ko-KR" altLang="en-US" dirty="0" err="1"/>
+              <a:t>를</a:t>
+            </a:r>
+            <a:r>
+              <a:rPr kumimoji="1" lang="ko-KR" altLang="en-US" dirty="0"/>
+              <a:t> 요청의 결과로 돌려준다</a:t>
+            </a:r>
+            <a:r>
+              <a:rPr kumimoji="1" lang="en-US" altLang="ko-KR" dirty="0"/>
+              <a:t>.</a:t>
+            </a:r>
+            <a:r>
+              <a:rPr kumimoji="1" lang="ko-KR" altLang="en-US" dirty="0"/>
+              <a:t>  </a:t>
+            </a:r>
+          </a:p>
+        </p:txBody>
+      </p:sp>
     </p:spTree>
     <p:extLst>
       <p:ext uri="{BB962C8B-B14F-4D97-AF65-F5344CB8AC3E}">
-        <p14:creationId xmlns:p14="http://schemas.microsoft.com/office/powerpoint/2010/main" val="1989630064"/>
+        <p14:creationId xmlns:p14="http://schemas.microsoft.com/office/powerpoint/2010/main" val="1237955149"/>
       </p:ext>
     </p:extLst>
   </p:cSld>
@@ -5144,481 +4917,119 @@
           <a:chExt cx="0" cy="0"/>
         </a:xfrm>
       </p:grpSpPr>
-      <p:pic>
-        <p:nvPicPr>
-          <p:cNvPr id="9" name="그림 8">
+      <p:sp>
+        <p:nvSpPr>
+          <p:cNvPr id="2" name="제목 1">
             <a:extLst>
               <a:ext uri="{FF2B5EF4-FFF2-40B4-BE49-F238E27FC236}">
-                <a16:creationId xmlns:a16="http://schemas.microsoft.com/office/drawing/2014/main" id="{3A46E90B-10B1-9249-B4A4-7F7C41828F55}"/>
+                <a16:creationId xmlns:a16="http://schemas.microsoft.com/office/drawing/2014/main" id="{9142BC89-6D9A-2144-B6ED-DB26B4255CD8}"/>
               </a:ext>
             </a:extLst>
           </p:cNvPr>
-          <p:cNvPicPr>
-            <a:picLocks noChangeAspect="1"/>
-          </p:cNvPicPr>
-          <p:nvPr/>
-        </p:nvPicPr>
-        <p:blipFill>
-          <a:blip r:embed="rId2"/>
-          <a:stretch>
-            <a:fillRect/>
-          </a:stretch>
-        </p:blipFill>
-        <p:spPr>
-          <a:xfrm>
-            <a:off x="576902" y="2555928"/>
-            <a:ext cx="7449372" cy="3977627"/>
-          </a:xfrm>
-          <a:prstGeom prst="rect">
-            <a:avLst/>
-          </a:prstGeom>
-        </p:spPr>
-      </p:pic>
-      <p:sp>
-        <p:nvSpPr>
-          <p:cNvPr id="2" name="제목 1">
+          <p:cNvSpPr>
+            <a:spLocks noGrp="1"/>
+          </p:cNvSpPr>
+          <p:nvPr>
+            <p:ph type="title"/>
+          </p:nvPr>
+        </p:nvSpPr>
+        <p:spPr/>
+        <p:txBody>
+          <a:bodyPr/>
+          <a:lstStyle/>
+          <a:p>
+            <a:r>
+              <a:rPr kumimoji="1" lang="ko-KR" altLang="en-US" dirty="0"/>
+              <a:t>화학 약품 추가하기</a:t>
+            </a:r>
+          </a:p>
+        </p:txBody>
+      </p:sp>
+      <p:grpSp>
+        <p:nvGrpSpPr>
+          <p:cNvPr id="7" name="그룹 6">
             <a:extLst>
               <a:ext uri="{FF2B5EF4-FFF2-40B4-BE49-F238E27FC236}">
-                <a16:creationId xmlns:a16="http://schemas.microsoft.com/office/drawing/2014/main" id="{98755B68-F0C7-3043-B982-2555679559EA}"/>
+                <a16:creationId xmlns:a16="http://schemas.microsoft.com/office/drawing/2014/main" id="{0BCF1FF0-7693-F441-805E-26DDA8118337}"/>
               </a:ext>
             </a:extLst>
           </p:cNvPr>
-          <p:cNvSpPr>
-            <a:spLocks noGrp="1"/>
-          </p:cNvSpPr>
-          <p:nvPr>
-            <p:ph type="title"/>
-          </p:nvPr>
-        </p:nvSpPr>
-        <p:spPr>
+          <p:cNvGrpSpPr/>
+          <p:nvPr/>
+        </p:nvGrpSpPr>
+        <p:grpSpPr>
           <a:xfrm>
-            <a:off x="75757" y="35517"/>
-            <a:ext cx="7886700" cy="1325563"/>
+            <a:off x="692150" y="1643487"/>
+            <a:ext cx="7759700" cy="4239025"/>
+            <a:chOff x="692150" y="1063938"/>
+            <a:chExt cx="7759700" cy="4239025"/>
           </a:xfrm>
-        </p:spPr>
-        <p:txBody>
-          <a:bodyPr/>
-          <a:lstStyle/>
-          <a:p>
-            <a:r>
-              <a:rPr kumimoji="1" lang="en-US" altLang="ko-KR" dirty="0"/>
-              <a:t>Implementation</a:t>
-            </a:r>
-            <a:endParaRPr kumimoji="1" lang="ko-KR" altLang="en-US" dirty="0"/>
-          </a:p>
-        </p:txBody>
-      </p:sp>
-      <p:sp>
-        <p:nvSpPr>
-          <p:cNvPr id="5" name="직사각형 4">
-            <a:extLst>
-              <a:ext uri="{FF2B5EF4-FFF2-40B4-BE49-F238E27FC236}">
-                <a16:creationId xmlns:a16="http://schemas.microsoft.com/office/drawing/2014/main" id="{C4EE269D-F7FD-5446-A869-9227B725247F}"/>
-              </a:ext>
-            </a:extLst>
-          </p:cNvPr>
-          <p:cNvSpPr/>
-          <p:nvPr/>
-        </p:nvSpPr>
-        <p:spPr>
-          <a:xfrm>
-            <a:off x="990433" y="3536753"/>
-            <a:ext cx="6996324" cy="1305685"/>
-          </a:xfrm>
-          <a:prstGeom prst="rect">
-            <a:avLst/>
-          </a:prstGeom>
-          <a:solidFill>
-            <a:schemeClr val="accent4">
-              <a:alpha val="21000"/>
-            </a:schemeClr>
-          </a:solidFill>
-          <a:ln>
-            <a:noFill/>
-          </a:ln>
-        </p:spPr>
-        <p:style>
-          <a:lnRef idx="2">
-            <a:schemeClr val="accent1">
-              <a:shade val="50000"/>
-            </a:schemeClr>
-          </a:lnRef>
-          <a:fillRef idx="1">
-            <a:schemeClr val="accent1"/>
-          </a:fillRef>
-          <a:effectRef idx="0">
-            <a:schemeClr val="accent1"/>
-          </a:effectRef>
-          <a:fontRef idx="minor">
-            <a:schemeClr val="lt1"/>
-          </a:fontRef>
-        </p:style>
-        <p:txBody>
-          <a:bodyPr rot="0" spcFirstLastPara="0" vertOverflow="overflow" horzOverflow="overflow" vert="horz" wrap="square" lIns="68580" tIns="34290" rIns="68580" bIns="34290" numCol="1" spcCol="0" rtlCol="0" fromWordArt="0" anchor="ctr" anchorCtr="0" forceAA="0" compatLnSpc="1">
-            <a:prstTxWarp prst="textNoShape">
+        </p:grpSpPr>
+        <p:pic>
+          <p:nvPicPr>
+            <p:cNvPr id="5" name="그림 4">
+              <a:extLst>
+                <a:ext uri="{FF2B5EF4-FFF2-40B4-BE49-F238E27FC236}">
+                  <a16:creationId xmlns:a16="http://schemas.microsoft.com/office/drawing/2014/main" id="{CFAA9824-94FB-6F42-8724-2151EED35E24}"/>
+                </a:ext>
+              </a:extLst>
+            </p:cNvPr>
+            <p:cNvPicPr>
+              <a:picLocks noChangeAspect="1"/>
+            </p:cNvPicPr>
+            <p:nvPr/>
+          </p:nvPicPr>
+          <p:blipFill>
+            <a:blip r:embed="rId2"/>
+            <a:stretch>
+              <a:fillRect/>
+            </a:stretch>
+          </p:blipFill>
+          <p:spPr>
+            <a:xfrm>
+              <a:off x="759853" y="1794420"/>
+              <a:ext cx="7601844" cy="3508543"/>
+            </a:xfrm>
+            <a:prstGeom prst="rect">
               <a:avLst/>
-            </a:prstTxWarp>
-            <a:noAutofit/>
-          </a:bodyPr>
-          <a:lstStyle/>
-          <a:p>
-            <a:pPr algn="ctr"/>
-            <a:endParaRPr kumimoji="1" lang="ko-KR" altLang="en-US" sz="1013" dirty="0"/>
-          </a:p>
-        </p:txBody>
-      </p:sp>
-      <p:cxnSp>
-        <p:nvCxnSpPr>
-          <p:cNvPr id="10" name="직선 연결선[R] 9">
-            <a:extLst>
-              <a:ext uri="{FF2B5EF4-FFF2-40B4-BE49-F238E27FC236}">
-                <a16:creationId xmlns:a16="http://schemas.microsoft.com/office/drawing/2014/main" id="{945FB098-1D3D-324D-A75F-9749529A1356}"/>
-              </a:ext>
-            </a:extLst>
-          </p:cNvPr>
-          <p:cNvCxnSpPr>
-            <a:cxnSpLocks/>
-          </p:cNvCxnSpPr>
-          <p:nvPr/>
-        </p:nvCxnSpPr>
-        <p:spPr>
-          <a:xfrm>
-            <a:off x="1541311" y="2902911"/>
-            <a:ext cx="1125140" cy="0"/>
-          </a:xfrm>
-          <a:prstGeom prst="line">
-            <a:avLst/>
-          </a:prstGeom>
-          <a:ln w="50800">
-            <a:solidFill>
-              <a:schemeClr val="accent4"/>
-            </a:solidFill>
-          </a:ln>
-        </p:spPr>
-        <p:style>
-          <a:lnRef idx="1">
-            <a:schemeClr val="accent1"/>
-          </a:lnRef>
-          <a:fillRef idx="0">
-            <a:schemeClr val="accent1"/>
-          </a:fillRef>
-          <a:effectRef idx="0">
-            <a:schemeClr val="accent1"/>
-          </a:effectRef>
-          <a:fontRef idx="minor">
-            <a:schemeClr val="tx1"/>
-          </a:fontRef>
-        </p:style>
-      </p:cxnSp>
-      <p:cxnSp>
-        <p:nvCxnSpPr>
-          <p:cNvPr id="12" name="직선 연결선[R] 11">
-            <a:extLst>
-              <a:ext uri="{FF2B5EF4-FFF2-40B4-BE49-F238E27FC236}">
-                <a16:creationId xmlns:a16="http://schemas.microsoft.com/office/drawing/2014/main" id="{D5FF9D32-FB93-A743-A1B6-1F156E1ED88B}"/>
-              </a:ext>
-            </a:extLst>
-          </p:cNvPr>
-          <p:cNvCxnSpPr>
-            <a:cxnSpLocks/>
-          </p:cNvCxnSpPr>
-          <p:nvPr/>
-        </p:nvCxnSpPr>
-        <p:spPr>
-          <a:xfrm>
-            <a:off x="1573458" y="4077420"/>
-            <a:ext cx="3218260" cy="0"/>
-          </a:xfrm>
-          <a:prstGeom prst="line">
-            <a:avLst/>
-          </a:prstGeom>
-          <a:ln w="50800">
-            <a:solidFill>
-              <a:schemeClr val="accent4"/>
-            </a:solidFill>
-          </a:ln>
-        </p:spPr>
-        <p:style>
-          <a:lnRef idx="1">
-            <a:schemeClr val="accent1"/>
-          </a:lnRef>
-          <a:fillRef idx="0">
-            <a:schemeClr val="accent1"/>
-          </a:fillRef>
-          <a:effectRef idx="0">
-            <a:schemeClr val="accent1"/>
-          </a:effectRef>
-          <a:fontRef idx="minor">
-            <a:schemeClr val="tx1"/>
-          </a:fontRef>
-        </p:style>
-      </p:cxnSp>
-      <p:cxnSp>
-        <p:nvCxnSpPr>
-          <p:cNvPr id="15" name="직선 연결선[R] 14">
-            <a:extLst>
-              <a:ext uri="{FF2B5EF4-FFF2-40B4-BE49-F238E27FC236}">
-                <a16:creationId xmlns:a16="http://schemas.microsoft.com/office/drawing/2014/main" id="{BEB65284-BC59-464F-8118-6DFD8C83B1E5}"/>
-              </a:ext>
-            </a:extLst>
-          </p:cNvPr>
-          <p:cNvCxnSpPr>
-            <a:cxnSpLocks/>
-          </p:cNvCxnSpPr>
-          <p:nvPr/>
-        </p:nvCxnSpPr>
-        <p:spPr>
-          <a:xfrm>
-            <a:off x="2331167" y="3795879"/>
-            <a:ext cx="4184787" cy="0"/>
-          </a:xfrm>
-          <a:prstGeom prst="line">
-            <a:avLst/>
-          </a:prstGeom>
-          <a:ln w="50800">
-            <a:solidFill>
-              <a:schemeClr val="accent4"/>
-            </a:solidFill>
-          </a:ln>
-        </p:spPr>
-        <p:style>
-          <a:lnRef idx="1">
-            <a:schemeClr val="accent1"/>
-          </a:lnRef>
-          <a:fillRef idx="0">
-            <a:schemeClr val="accent1"/>
-          </a:fillRef>
-          <a:effectRef idx="0">
-            <a:schemeClr val="accent1"/>
-          </a:effectRef>
-          <a:fontRef idx="minor">
-            <a:schemeClr val="tx1"/>
-          </a:fontRef>
-        </p:style>
-      </p:cxnSp>
-      <p:sp>
-        <p:nvSpPr>
-          <p:cNvPr id="17" name="TextBox 16">
-            <a:extLst>
-              <a:ext uri="{FF2B5EF4-FFF2-40B4-BE49-F238E27FC236}">
-                <a16:creationId xmlns:a16="http://schemas.microsoft.com/office/drawing/2014/main" id="{CA3923D9-7288-A54D-910D-A52D2C912D57}"/>
-              </a:ext>
-            </a:extLst>
-          </p:cNvPr>
-          <p:cNvSpPr txBox="1"/>
-          <p:nvPr/>
-        </p:nvSpPr>
-        <p:spPr>
-          <a:xfrm>
-            <a:off x="4881014" y="3942202"/>
-            <a:ext cx="4061223" cy="404085"/>
-          </a:xfrm>
-          <a:prstGeom prst="rect">
-            <a:avLst/>
-          </a:prstGeom>
-          <a:solidFill>
-            <a:schemeClr val="bg1"/>
-          </a:solidFill>
-          <a:ln w="50800">
-            <a:solidFill>
-              <a:schemeClr val="accent2"/>
-            </a:solidFill>
-          </a:ln>
-        </p:spPr>
-        <p:txBody>
-          <a:bodyPr wrap="square" rtlCol="0">
-            <a:spAutoFit/>
-          </a:bodyPr>
-          <a:lstStyle/>
-          <a:p>
-            <a:r>
-              <a:rPr kumimoji="1" lang="en-US" altLang="ko-KR" sz="1013" dirty="0" err="1"/>
-              <a:t>userID</a:t>
-            </a:r>
-            <a:r>
-              <a:rPr kumimoji="1" lang="ko-KR" altLang="en-US" sz="1013" dirty="0"/>
-              <a:t>에</a:t>
-            </a:r>
-            <a:r>
-              <a:rPr kumimoji="1" lang="en-US" altLang="ko-KR" sz="1013" dirty="0"/>
-              <a:t> chemical</a:t>
-            </a:r>
-            <a:r>
-              <a:rPr kumimoji="1" lang="ko-KR" altLang="en-US" sz="1013" dirty="0"/>
-              <a:t>의 인스턴스 변수에 자동으로 매핑 된 정보들</a:t>
-            </a:r>
-            <a:r>
-              <a:rPr kumimoji="1" lang="en-US" altLang="ko-KR" sz="1013" dirty="0"/>
-              <a:t>(</a:t>
-            </a:r>
-            <a:r>
-              <a:rPr kumimoji="1" lang="ko-KR" altLang="en-US" sz="1013" dirty="0"/>
-              <a:t>화학약품 이름</a:t>
-            </a:r>
-            <a:r>
-              <a:rPr kumimoji="1" lang="en-US" altLang="ko-KR" sz="1013" dirty="0"/>
-              <a:t>,</a:t>
-            </a:r>
-            <a:r>
-              <a:rPr kumimoji="1" lang="ko-KR" altLang="en-US" sz="1013" dirty="0"/>
-              <a:t> 장소</a:t>
-            </a:r>
-            <a:r>
-              <a:rPr kumimoji="1" lang="en-US" altLang="ko-KR" sz="1013" dirty="0"/>
-              <a:t>)</a:t>
-            </a:r>
-            <a:r>
-              <a:rPr kumimoji="1" lang="ko-KR" altLang="en-US" sz="1013" dirty="0"/>
-              <a:t>을 </a:t>
-            </a:r>
-            <a:r>
-              <a:rPr kumimoji="1" lang="en-US" altLang="ko-KR" sz="1013" dirty="0"/>
-              <a:t>write</a:t>
-            </a:r>
-            <a:endParaRPr kumimoji="1" lang="ko-KR" altLang="en-US" sz="1013" dirty="0"/>
-          </a:p>
-        </p:txBody>
-      </p:sp>
-      <p:sp>
-        <p:nvSpPr>
-          <p:cNvPr id="18" name="TextBox 17">
-            <a:extLst>
-              <a:ext uri="{FF2B5EF4-FFF2-40B4-BE49-F238E27FC236}">
-                <a16:creationId xmlns:a16="http://schemas.microsoft.com/office/drawing/2014/main" id="{92A6FDF4-76D5-A94D-B819-721A16AC3820}"/>
-              </a:ext>
-            </a:extLst>
-          </p:cNvPr>
-          <p:cNvSpPr txBox="1"/>
-          <p:nvPr/>
-        </p:nvSpPr>
-        <p:spPr>
-          <a:xfrm>
-            <a:off x="3097670" y="4431299"/>
-            <a:ext cx="3218260" cy="248209"/>
-          </a:xfrm>
-          <a:prstGeom prst="rect">
-            <a:avLst/>
-          </a:prstGeom>
-          <a:solidFill>
-            <a:schemeClr val="bg1"/>
-          </a:solidFill>
-          <a:ln w="50800">
-            <a:solidFill>
-              <a:schemeClr val="accent2"/>
-            </a:solidFill>
-          </a:ln>
-        </p:spPr>
-        <p:txBody>
-          <a:bodyPr wrap="square" rtlCol="0">
-            <a:spAutoFit/>
-          </a:bodyPr>
-          <a:lstStyle/>
-          <a:p>
-            <a:r>
-              <a:rPr kumimoji="1" lang="en-US" altLang="ko-KR" sz="1013" dirty="0" err="1"/>
-              <a:t>chemicalService</a:t>
-            </a:r>
-            <a:r>
-              <a:rPr kumimoji="1" lang="ko-KR" altLang="en-US" sz="1013" dirty="0"/>
-              <a:t>의 </a:t>
-            </a:r>
-            <a:r>
-              <a:rPr kumimoji="1" lang="en-US" altLang="ko-KR" sz="1013" dirty="0" err="1"/>
-              <a:t>addChemical</a:t>
-            </a:r>
-            <a:r>
-              <a:rPr kumimoji="1" lang="ko-KR" altLang="en-US" sz="1013" dirty="0" err="1"/>
-              <a:t>를</a:t>
-            </a:r>
-            <a:r>
-              <a:rPr kumimoji="1" lang="ko-KR" altLang="en-US" sz="1013" dirty="0"/>
-              <a:t> 호출</a:t>
-            </a:r>
-            <a:r>
-              <a:rPr kumimoji="1" lang="en-US" altLang="ko-KR" sz="1013" dirty="0"/>
-              <a:t>.</a:t>
-            </a:r>
-            <a:r>
-              <a:rPr kumimoji="1" lang="ko-KR" altLang="en-US" sz="1013" dirty="0"/>
-              <a:t> </a:t>
-            </a:r>
-          </a:p>
-        </p:txBody>
-      </p:sp>
-      <p:pic>
-        <p:nvPicPr>
-          <p:cNvPr id="11" name="그림 10">
-            <a:extLst>
-              <a:ext uri="{FF2B5EF4-FFF2-40B4-BE49-F238E27FC236}">
-                <a16:creationId xmlns:a16="http://schemas.microsoft.com/office/drawing/2014/main" id="{D132FB06-8A64-B749-B891-D9BE5F347B05}"/>
-              </a:ext>
-            </a:extLst>
-          </p:cNvPr>
-          <p:cNvPicPr>
-            <a:picLocks noChangeAspect="1"/>
-          </p:cNvPicPr>
-          <p:nvPr/>
-        </p:nvPicPr>
-        <p:blipFill>
-          <a:blip r:embed="rId3"/>
-          <a:stretch>
-            <a:fillRect/>
-          </a:stretch>
-        </p:blipFill>
-        <p:spPr>
-          <a:xfrm>
-            <a:off x="5706117" y="1479095"/>
-            <a:ext cx="2647766" cy="1949905"/>
-          </a:xfrm>
-          <a:prstGeom prst="rect">
-            <a:avLst/>
-          </a:prstGeom>
-          <a:ln w="50800">
-            <a:solidFill>
-              <a:schemeClr val="accent4"/>
-            </a:solidFill>
-          </a:ln>
-        </p:spPr>
-      </p:pic>
-      <p:pic>
-        <p:nvPicPr>
-          <p:cNvPr id="13" name="그림 12">
-            <a:extLst>
-              <a:ext uri="{FF2B5EF4-FFF2-40B4-BE49-F238E27FC236}">
-                <a16:creationId xmlns:a16="http://schemas.microsoft.com/office/drawing/2014/main" id="{F22B9FE0-6722-8C4C-984D-F7C8111657E8}"/>
-              </a:ext>
-            </a:extLst>
-          </p:cNvPr>
-          <p:cNvPicPr>
-            <a:picLocks noChangeAspect="1"/>
-          </p:cNvPicPr>
-          <p:nvPr/>
-        </p:nvPicPr>
-        <p:blipFill>
-          <a:blip r:embed="rId4"/>
-          <a:stretch>
-            <a:fillRect/>
-          </a:stretch>
-        </p:blipFill>
-        <p:spPr>
-          <a:xfrm>
-            <a:off x="2331167" y="1059882"/>
-            <a:ext cx="2921737" cy="1525319"/>
-          </a:xfrm>
-          <a:prstGeom prst="rect">
-            <a:avLst/>
-          </a:prstGeom>
-          <a:ln w="50800">
-            <a:solidFill>
-              <a:schemeClr val="accent4"/>
-            </a:solidFill>
-          </a:ln>
-        </p:spPr>
-      </p:pic>
+            </a:prstGeom>
+          </p:spPr>
+        </p:pic>
+        <p:pic>
+          <p:nvPicPr>
+            <p:cNvPr id="6" name="그림 5">
+              <a:extLst>
+                <a:ext uri="{FF2B5EF4-FFF2-40B4-BE49-F238E27FC236}">
+                  <a16:creationId xmlns:a16="http://schemas.microsoft.com/office/drawing/2014/main" id="{55E3269B-01C7-1E4F-9ED6-2121970BB114}"/>
+                </a:ext>
+              </a:extLst>
+            </p:cNvPr>
+            <p:cNvPicPr>
+              <a:picLocks noChangeAspect="1"/>
+            </p:cNvPicPr>
+            <p:nvPr/>
+          </p:nvPicPr>
+          <p:blipFill>
+            <a:blip r:embed="rId3"/>
+            <a:stretch>
+              <a:fillRect/>
+            </a:stretch>
+          </p:blipFill>
+          <p:spPr>
+            <a:xfrm>
+              <a:off x="692150" y="1063938"/>
+              <a:ext cx="7759700" cy="723573"/>
+            </a:xfrm>
+            <a:prstGeom prst="rect">
+              <a:avLst/>
+            </a:prstGeom>
+          </p:spPr>
+        </p:pic>
+      </p:grpSp>
     </p:spTree>
     <p:extLst>
       <p:ext uri="{BB962C8B-B14F-4D97-AF65-F5344CB8AC3E}">
-        <p14:creationId xmlns:p14="http://schemas.microsoft.com/office/powerpoint/2010/main" val="3248408951"/>
+        <p14:creationId xmlns:p14="http://schemas.microsoft.com/office/powerpoint/2010/main" val="1403437048"/>
       </p:ext>
     </p:extLst>
   </p:cSld>
@@ -5645,12 +5056,41 @@
           <a:chExt cx="0" cy="0"/>
         </a:xfrm>
       </p:grpSpPr>
+      <p:sp>
+        <p:nvSpPr>
+          <p:cNvPr id="2" name="제목 1">
+            <a:extLst>
+              <a:ext uri="{FF2B5EF4-FFF2-40B4-BE49-F238E27FC236}">
+                <a16:creationId xmlns:a16="http://schemas.microsoft.com/office/drawing/2014/main" id="{53EDF894-012C-8548-9FB8-C1EA274BFF26}"/>
+              </a:ext>
+            </a:extLst>
+          </p:cNvPr>
+          <p:cNvSpPr>
+            <a:spLocks noGrp="1"/>
+          </p:cNvSpPr>
+          <p:nvPr>
+            <p:ph type="title"/>
+          </p:nvPr>
+        </p:nvSpPr>
+        <p:spPr/>
+        <p:txBody>
+          <a:bodyPr/>
+          <a:lstStyle/>
+          <a:p>
+            <a:r>
+              <a:rPr kumimoji="1" lang="en-US" altLang="ko-KR" dirty="0"/>
+              <a:t>Implementation</a:t>
+            </a:r>
+            <a:endParaRPr kumimoji="1" lang="ko-KR" altLang="en-US" dirty="0"/>
+          </a:p>
+        </p:txBody>
+      </p:sp>
       <p:pic>
         <p:nvPicPr>
-          <p:cNvPr id="18" name="그림 17">
+          <p:cNvPr id="4" name="그림 3">
             <a:extLst>
               <a:ext uri="{FF2B5EF4-FFF2-40B4-BE49-F238E27FC236}">
-                <a16:creationId xmlns:a16="http://schemas.microsoft.com/office/drawing/2014/main" id="{7D9F5CB5-C62C-1D49-B8A0-CE1603C348F3}"/>
+                <a16:creationId xmlns:a16="http://schemas.microsoft.com/office/drawing/2014/main" id="{AC00A60B-B8D2-FB41-AF9C-A99E91900F66}"/>
               </a:ext>
             </a:extLst>
           </p:cNvPr>
@@ -5667,547 +5107,8 @@
         </p:blipFill>
         <p:spPr>
           <a:xfrm>
-            <a:off x="652566" y="3301008"/>
-            <a:ext cx="4472807" cy="3365255"/>
-          </a:xfrm>
-          <a:prstGeom prst="rect">
-            <a:avLst/>
-          </a:prstGeom>
-        </p:spPr>
-      </p:pic>
-      <p:sp>
-        <p:nvSpPr>
-          <p:cNvPr id="2" name="제목 1">
-            <a:extLst>
-              <a:ext uri="{FF2B5EF4-FFF2-40B4-BE49-F238E27FC236}">
-                <a16:creationId xmlns:a16="http://schemas.microsoft.com/office/drawing/2014/main" id="{D2D48E45-375F-CE45-A39C-63EF6BE8E6EB}"/>
-              </a:ext>
-            </a:extLst>
-          </p:cNvPr>
-          <p:cNvSpPr>
-            <a:spLocks noGrp="1"/>
-          </p:cNvSpPr>
-          <p:nvPr>
-            <p:ph type="title"/>
-          </p:nvPr>
-        </p:nvSpPr>
-        <p:spPr>
-          <a:xfrm>
-            <a:off x="75757" y="35517"/>
-            <a:ext cx="7886700" cy="1325563"/>
-          </a:xfrm>
-        </p:spPr>
-        <p:txBody>
-          <a:bodyPr/>
-          <a:lstStyle/>
-          <a:p>
-            <a:r>
-              <a:rPr kumimoji="1" lang="en-US" altLang="ko-KR" dirty="0"/>
-              <a:t>Implementation</a:t>
-            </a:r>
-            <a:endParaRPr kumimoji="1" lang="ko-KR" altLang="en-US" dirty="0"/>
-          </a:p>
-        </p:txBody>
-      </p:sp>
-      <p:sp>
-        <p:nvSpPr>
-          <p:cNvPr id="5" name="직사각형 4">
-            <a:extLst>
-              <a:ext uri="{FF2B5EF4-FFF2-40B4-BE49-F238E27FC236}">
-                <a16:creationId xmlns:a16="http://schemas.microsoft.com/office/drawing/2014/main" id="{A8F7DA85-199D-9145-8069-BF1BBF863850}"/>
-              </a:ext>
-            </a:extLst>
-          </p:cNvPr>
-          <p:cNvSpPr/>
-          <p:nvPr/>
-        </p:nvSpPr>
-        <p:spPr>
-          <a:xfrm>
-            <a:off x="797966" y="4368415"/>
-            <a:ext cx="5271109" cy="1300781"/>
-          </a:xfrm>
-          <a:prstGeom prst="rect">
-            <a:avLst/>
-          </a:prstGeom>
-          <a:solidFill>
-            <a:schemeClr val="accent4">
-              <a:alpha val="20000"/>
-            </a:schemeClr>
-          </a:solidFill>
-          <a:ln>
-            <a:noFill/>
-          </a:ln>
-        </p:spPr>
-        <p:style>
-          <a:lnRef idx="2">
-            <a:schemeClr val="accent1">
-              <a:shade val="50000"/>
-            </a:schemeClr>
-          </a:lnRef>
-          <a:fillRef idx="1">
-            <a:schemeClr val="accent1"/>
-          </a:fillRef>
-          <a:effectRef idx="0">
-            <a:schemeClr val="accent1"/>
-          </a:effectRef>
-          <a:fontRef idx="minor">
-            <a:schemeClr val="lt1"/>
-          </a:fontRef>
-        </p:style>
-        <p:txBody>
-          <a:bodyPr rot="0" spcFirstLastPara="0" vertOverflow="overflow" horzOverflow="overflow" vert="horz" wrap="square" lIns="68580" tIns="34290" rIns="68580" bIns="34290" numCol="1" spcCol="0" rtlCol="0" fromWordArt="0" anchor="ctr" anchorCtr="0" forceAA="0" compatLnSpc="1">
-            <a:prstTxWarp prst="textNoShape">
-              <a:avLst/>
-            </a:prstTxWarp>
-            <a:noAutofit/>
-          </a:bodyPr>
-          <a:lstStyle/>
-          <a:p>
-            <a:pPr algn="ctr"/>
-            <a:endParaRPr kumimoji="1" lang="ko-KR" altLang="en-US" sz="1013"/>
-          </a:p>
-        </p:txBody>
-      </p:sp>
-      <p:cxnSp>
-        <p:nvCxnSpPr>
-          <p:cNvPr id="8" name="직선 연결선[R] 7">
-            <a:extLst>
-              <a:ext uri="{FF2B5EF4-FFF2-40B4-BE49-F238E27FC236}">
-                <a16:creationId xmlns:a16="http://schemas.microsoft.com/office/drawing/2014/main" id="{85DAB48A-031C-FE41-A261-D4F1E54211AE}"/>
-              </a:ext>
-            </a:extLst>
-          </p:cNvPr>
-          <p:cNvCxnSpPr>
-            <a:cxnSpLocks/>
-          </p:cNvCxnSpPr>
-          <p:nvPr/>
-        </p:nvCxnSpPr>
-        <p:spPr>
-          <a:xfrm>
-            <a:off x="1504218" y="3604246"/>
-            <a:ext cx="1125140" cy="0"/>
-          </a:xfrm>
-          <a:prstGeom prst="line">
-            <a:avLst/>
-          </a:prstGeom>
-          <a:ln w="50800">
-            <a:solidFill>
-              <a:schemeClr val="accent4"/>
-            </a:solidFill>
-          </a:ln>
-        </p:spPr>
-        <p:style>
-          <a:lnRef idx="1">
-            <a:schemeClr val="accent1"/>
-          </a:lnRef>
-          <a:fillRef idx="0">
-            <a:schemeClr val="accent1"/>
-          </a:fillRef>
-          <a:effectRef idx="0">
-            <a:schemeClr val="accent1"/>
-          </a:effectRef>
-          <a:fontRef idx="minor">
-            <a:schemeClr val="tx1"/>
-          </a:fontRef>
-        </p:style>
-      </p:cxnSp>
-      <p:cxnSp>
-        <p:nvCxnSpPr>
-          <p:cNvPr id="9" name="직선 연결선[R] 8">
-            <a:extLst>
-              <a:ext uri="{FF2B5EF4-FFF2-40B4-BE49-F238E27FC236}">
-                <a16:creationId xmlns:a16="http://schemas.microsoft.com/office/drawing/2014/main" id="{BE777BCF-A999-D842-B506-0CFD3D6CCFDE}"/>
-              </a:ext>
-            </a:extLst>
-          </p:cNvPr>
-          <p:cNvCxnSpPr>
-            <a:cxnSpLocks/>
-          </p:cNvCxnSpPr>
-          <p:nvPr/>
-        </p:nvCxnSpPr>
-        <p:spPr>
-          <a:xfrm>
-            <a:off x="1783743" y="4895250"/>
-            <a:ext cx="2999272" cy="0"/>
-          </a:xfrm>
-          <a:prstGeom prst="line">
-            <a:avLst/>
-          </a:prstGeom>
-          <a:ln w="50800">
-            <a:solidFill>
-              <a:schemeClr val="accent4"/>
-            </a:solidFill>
-          </a:ln>
-        </p:spPr>
-        <p:style>
-          <a:lnRef idx="1">
-            <a:schemeClr val="accent1"/>
-          </a:lnRef>
-          <a:fillRef idx="0">
-            <a:schemeClr val="accent1"/>
-          </a:fillRef>
-          <a:effectRef idx="0">
-            <a:schemeClr val="accent1"/>
-          </a:effectRef>
-          <a:fontRef idx="minor">
-            <a:schemeClr val="tx1"/>
-          </a:fontRef>
-        </p:style>
-      </p:cxnSp>
-      <p:sp>
-        <p:nvSpPr>
-          <p:cNvPr id="11" name="TextBox 10">
-            <a:extLst>
-              <a:ext uri="{FF2B5EF4-FFF2-40B4-BE49-F238E27FC236}">
-                <a16:creationId xmlns:a16="http://schemas.microsoft.com/office/drawing/2014/main" id="{0AB60F80-B9D0-BE46-A546-CE79C4675B36}"/>
-              </a:ext>
-            </a:extLst>
-          </p:cNvPr>
-          <p:cNvSpPr txBox="1"/>
-          <p:nvPr/>
-        </p:nvSpPr>
-        <p:spPr>
-          <a:xfrm>
-            <a:off x="4929646" y="4971077"/>
-            <a:ext cx="3814763" cy="1339341"/>
-          </a:xfrm>
-          <a:prstGeom prst="rect">
-            <a:avLst/>
-          </a:prstGeom>
-          <a:solidFill>
-            <a:schemeClr val="bg1"/>
-          </a:solidFill>
-          <a:ln w="50800">
-            <a:solidFill>
-              <a:schemeClr val="accent2"/>
-            </a:solidFill>
-          </a:ln>
-        </p:spPr>
-        <p:txBody>
-          <a:bodyPr wrap="square" rtlCol="0">
-            <a:spAutoFit/>
-          </a:bodyPr>
-          <a:lstStyle/>
-          <a:p>
-            <a:pPr marL="257168" indent="-257168">
-              <a:buAutoNum type="arabicPeriod"/>
-            </a:pPr>
-            <a:r>
-              <a:rPr kumimoji="1" lang="ko-KR" altLang="en-US" sz="1013" dirty="0"/>
-              <a:t>저장하고자 하는 화학약품 그 자체를 저장 </a:t>
-            </a:r>
-            <a:r>
-              <a:rPr kumimoji="1" lang="en-US" altLang="ko-KR" sz="1013" dirty="0"/>
-              <a:t>(</a:t>
-            </a:r>
-            <a:r>
-              <a:rPr kumimoji="1" lang="en-US" altLang="ko-KR" sz="1013" dirty="0" err="1"/>
-              <a:t>chemicalRepostiory.save</a:t>
-            </a:r>
-            <a:r>
-              <a:rPr kumimoji="1" lang="en-US" altLang="ko-KR" sz="1013" dirty="0"/>
-              <a:t>())</a:t>
-            </a:r>
-          </a:p>
-          <a:p>
-            <a:pPr marL="257168" indent="-257168">
-              <a:buAutoNum type="arabicPeriod"/>
-            </a:pPr>
-            <a:r>
-              <a:rPr kumimoji="1" lang="en-US" altLang="ko-KR" sz="1013" dirty="0" err="1"/>
-              <a:t>userID</a:t>
-            </a:r>
-            <a:r>
-              <a:rPr kumimoji="1" lang="ko-KR" altLang="en-US" sz="1013" dirty="0"/>
-              <a:t>에 해당하는 </a:t>
-            </a:r>
-            <a:r>
-              <a:rPr kumimoji="1" lang="en-US" altLang="ko-KR" sz="1013" dirty="0"/>
-              <a:t>user</a:t>
-            </a:r>
-            <a:r>
-              <a:rPr kumimoji="1" lang="ko-KR" altLang="en-US" sz="1013" dirty="0" err="1"/>
-              <a:t>를</a:t>
-            </a:r>
-            <a:r>
-              <a:rPr kumimoji="1" lang="ko-KR" altLang="en-US" sz="1013" dirty="0"/>
-              <a:t> 찾아옴 </a:t>
-            </a:r>
-            <a:r>
-              <a:rPr kumimoji="1" lang="en-US" altLang="ko-KR" sz="1013" dirty="0"/>
-              <a:t>(</a:t>
-            </a:r>
-            <a:r>
-              <a:rPr kumimoji="1" lang="en-US" altLang="ko-KR" sz="1013" dirty="0" err="1"/>
-              <a:t>userRepository.findbyID</a:t>
-            </a:r>
-            <a:r>
-              <a:rPr kumimoji="1" lang="en-US" altLang="ko-KR" sz="1013" dirty="0"/>
-              <a:t>())</a:t>
-            </a:r>
-          </a:p>
-          <a:p>
-            <a:pPr marL="257168" indent="-257168">
-              <a:buAutoNum type="arabicPeriod"/>
-            </a:pPr>
-            <a:r>
-              <a:rPr kumimoji="1" lang="en-US" altLang="ko-KR" sz="1013" dirty="0"/>
-              <a:t>user</a:t>
-            </a:r>
-            <a:r>
-              <a:rPr kumimoji="1" lang="ko-KR" altLang="en-US" sz="1013" dirty="0"/>
-              <a:t>의 </a:t>
-            </a:r>
-            <a:r>
-              <a:rPr kumimoji="1" lang="en-US" altLang="ko-KR" sz="1013" dirty="0"/>
-              <a:t>chemical(</a:t>
-            </a:r>
-            <a:r>
-              <a:rPr kumimoji="1" lang="ko-KR" altLang="en-US" sz="1013" dirty="0"/>
-              <a:t>리스트</a:t>
-            </a:r>
-            <a:r>
-              <a:rPr kumimoji="1" lang="en-US" altLang="ko-KR" sz="1013" dirty="0"/>
-              <a:t>)</a:t>
-            </a:r>
-            <a:r>
-              <a:rPr kumimoji="1" lang="ko-KR" altLang="en-US" sz="1013" dirty="0"/>
-              <a:t>에 화학약품을 추가 </a:t>
-            </a:r>
-            <a:r>
-              <a:rPr kumimoji="1" lang="en-US" altLang="ko-KR" sz="1013" dirty="0"/>
-              <a:t>(</a:t>
-            </a:r>
-            <a:r>
-              <a:rPr kumimoji="1" lang="en-US" altLang="ko-KR" sz="1013" dirty="0" err="1"/>
-              <a:t>userEntity.getChemicals</a:t>
-            </a:r>
-            <a:r>
-              <a:rPr kumimoji="1" lang="en-US" altLang="ko-KR" sz="1013" dirty="0"/>
-              <a:t>().add())</a:t>
-            </a:r>
-          </a:p>
-          <a:p>
-            <a:pPr marL="257168" indent="-257168">
-              <a:buAutoNum type="arabicPeriod"/>
-            </a:pPr>
-            <a:r>
-              <a:rPr kumimoji="1" lang="en-US" altLang="ko-KR" sz="1013" dirty="0"/>
-              <a:t>user</a:t>
-            </a:r>
-            <a:r>
-              <a:rPr kumimoji="1" lang="ko-KR" altLang="en-US" sz="1013" dirty="0" err="1"/>
-              <a:t>를</a:t>
-            </a:r>
-            <a:r>
-              <a:rPr kumimoji="1" lang="ko-KR" altLang="en-US" sz="1013" dirty="0"/>
-              <a:t> 데이터베이스에 저장 </a:t>
-            </a:r>
-            <a:r>
-              <a:rPr kumimoji="1" lang="en-US" altLang="ko-KR" sz="1013" dirty="0"/>
-              <a:t>(</a:t>
-            </a:r>
-            <a:r>
-              <a:rPr kumimoji="1" lang="en-US" altLang="ko-KR" sz="1013" dirty="0" err="1"/>
-              <a:t>userRepository.save</a:t>
-            </a:r>
-            <a:r>
-              <a:rPr kumimoji="1" lang="en-US" altLang="ko-KR" sz="1013" dirty="0"/>
-              <a:t>()) -&gt; </a:t>
-            </a:r>
-            <a:r>
-              <a:rPr kumimoji="1" lang="ko-KR" altLang="en-US" sz="1013" dirty="0"/>
-              <a:t>여기서 </a:t>
-            </a:r>
-            <a:r>
-              <a:rPr kumimoji="1" lang="en-US" altLang="ko-KR" sz="1013" dirty="0"/>
-              <a:t>user</a:t>
-            </a:r>
-            <a:r>
-              <a:rPr kumimoji="1" lang="ko-KR" altLang="en-US" sz="1013" dirty="0"/>
-              <a:t> 테이블과 </a:t>
-            </a:r>
-            <a:r>
-              <a:rPr kumimoji="1" lang="en-US" altLang="ko-KR" sz="1013" dirty="0"/>
-              <a:t>chemical</a:t>
-            </a:r>
-            <a:r>
-              <a:rPr kumimoji="1" lang="ko-KR" altLang="en-US" sz="1013" dirty="0"/>
-              <a:t> </a:t>
-            </a:r>
-            <a:r>
-              <a:rPr kumimoji="1" lang="ko-KR" altLang="en-US" sz="1013" dirty="0" err="1"/>
-              <a:t>테이블간의</a:t>
-            </a:r>
-            <a:r>
-              <a:rPr kumimoji="1" lang="ko-KR" altLang="en-US" sz="1013" dirty="0"/>
-              <a:t> </a:t>
-            </a:r>
-            <a:r>
-              <a:rPr kumimoji="1" lang="en-US" altLang="ko-KR" sz="1013" dirty="0"/>
-              <a:t>relationship</a:t>
-            </a:r>
-            <a:r>
-              <a:rPr kumimoji="1" lang="ko-KR" altLang="en-US" sz="1013" dirty="0"/>
-              <a:t>도 자동으로 저장됨 </a:t>
-            </a:r>
-            <a:endParaRPr kumimoji="1" lang="en-US" altLang="ko-KR" sz="1013" dirty="0"/>
-          </a:p>
-        </p:txBody>
-      </p:sp>
-      <p:cxnSp>
-        <p:nvCxnSpPr>
-          <p:cNvPr id="12" name="직선 연결선[R] 11">
-            <a:extLst>
-              <a:ext uri="{FF2B5EF4-FFF2-40B4-BE49-F238E27FC236}">
-                <a16:creationId xmlns:a16="http://schemas.microsoft.com/office/drawing/2014/main" id="{0D78D93A-B5CB-F84B-9827-524B4011A203}"/>
-              </a:ext>
-            </a:extLst>
-          </p:cNvPr>
-          <p:cNvCxnSpPr>
-            <a:cxnSpLocks/>
-          </p:cNvCxnSpPr>
-          <p:nvPr/>
-        </p:nvCxnSpPr>
-        <p:spPr>
-          <a:xfrm>
-            <a:off x="1929270" y="5118720"/>
-            <a:ext cx="2089837" cy="0"/>
-          </a:xfrm>
-          <a:prstGeom prst="line">
-            <a:avLst/>
-          </a:prstGeom>
-          <a:ln w="38100">
-            <a:solidFill>
-              <a:schemeClr val="accent4"/>
-            </a:solidFill>
-          </a:ln>
-        </p:spPr>
-        <p:style>
-          <a:lnRef idx="1">
-            <a:schemeClr val="accent1"/>
-          </a:lnRef>
-          <a:fillRef idx="0">
-            <a:schemeClr val="accent1"/>
-          </a:fillRef>
-          <a:effectRef idx="0">
-            <a:schemeClr val="accent1"/>
-          </a:effectRef>
-          <a:fontRef idx="minor">
-            <a:schemeClr val="tx1"/>
-          </a:fontRef>
-        </p:style>
-      </p:cxnSp>
-      <p:cxnSp>
-        <p:nvCxnSpPr>
-          <p:cNvPr id="13" name="직선 연결선[R] 12">
-            <a:extLst>
-              <a:ext uri="{FF2B5EF4-FFF2-40B4-BE49-F238E27FC236}">
-                <a16:creationId xmlns:a16="http://schemas.microsoft.com/office/drawing/2014/main" id="{9F72D027-06CE-2843-808F-A422FCE97054}"/>
-              </a:ext>
-            </a:extLst>
-          </p:cNvPr>
-          <p:cNvCxnSpPr>
-            <a:cxnSpLocks/>
-          </p:cNvCxnSpPr>
-          <p:nvPr/>
-        </p:nvCxnSpPr>
-        <p:spPr>
-          <a:xfrm>
-            <a:off x="1775679" y="5289621"/>
-            <a:ext cx="1881921" cy="0"/>
-          </a:xfrm>
-          <a:prstGeom prst="line">
-            <a:avLst/>
-          </a:prstGeom>
-          <a:ln w="38100">
-            <a:solidFill>
-              <a:schemeClr val="accent4"/>
-            </a:solidFill>
-          </a:ln>
-        </p:spPr>
-        <p:style>
-          <a:lnRef idx="1">
-            <a:schemeClr val="accent1"/>
-          </a:lnRef>
-          <a:fillRef idx="0">
-            <a:schemeClr val="accent1"/>
-          </a:fillRef>
-          <a:effectRef idx="0">
-            <a:schemeClr val="accent1"/>
-          </a:effectRef>
-          <a:fontRef idx="minor">
-            <a:schemeClr val="tx1"/>
-          </a:fontRef>
-        </p:style>
-      </p:cxnSp>
-      <p:cxnSp>
-        <p:nvCxnSpPr>
-          <p:cNvPr id="14" name="직선 연결선[R] 13">
-            <a:extLst>
-              <a:ext uri="{FF2B5EF4-FFF2-40B4-BE49-F238E27FC236}">
-                <a16:creationId xmlns:a16="http://schemas.microsoft.com/office/drawing/2014/main" id="{FE81F8AA-E6D0-004C-9B4A-F42DD0829E3A}"/>
-              </a:ext>
-            </a:extLst>
-          </p:cNvPr>
-          <p:cNvCxnSpPr>
-            <a:cxnSpLocks/>
-          </p:cNvCxnSpPr>
-          <p:nvPr/>
-        </p:nvCxnSpPr>
-        <p:spPr>
-          <a:xfrm>
-            <a:off x="1172032" y="5529486"/>
-            <a:ext cx="1982391" cy="0"/>
-          </a:xfrm>
-          <a:prstGeom prst="line">
-            <a:avLst/>
-          </a:prstGeom>
-          <a:ln w="50800">
-            <a:solidFill>
-              <a:schemeClr val="accent4"/>
-            </a:solidFill>
-          </a:ln>
-        </p:spPr>
-        <p:style>
-          <a:lnRef idx="1">
-            <a:schemeClr val="accent1"/>
-          </a:lnRef>
-          <a:fillRef idx="0">
-            <a:schemeClr val="accent1"/>
-          </a:fillRef>
-          <a:effectRef idx="0">
-            <a:schemeClr val="accent1"/>
-          </a:effectRef>
-          <a:fontRef idx="minor">
-            <a:schemeClr val="tx1"/>
-          </a:fontRef>
-        </p:style>
-      </p:cxnSp>
-      <p:pic>
-        <p:nvPicPr>
-          <p:cNvPr id="16" name="그림 15">
-            <a:extLst>
-              <a:ext uri="{FF2B5EF4-FFF2-40B4-BE49-F238E27FC236}">
-                <a16:creationId xmlns:a16="http://schemas.microsoft.com/office/drawing/2014/main" id="{A939061F-4237-9246-B6D8-2DB15F226CF0}"/>
-              </a:ext>
-            </a:extLst>
-          </p:cNvPr>
-          <p:cNvPicPr>
-            <a:picLocks noChangeAspect="1"/>
-          </p:cNvPicPr>
-          <p:nvPr/>
-        </p:nvPicPr>
-        <p:blipFill>
-          <a:blip r:embed="rId3"/>
-          <a:stretch>
-            <a:fillRect/>
-          </a:stretch>
-        </p:blipFill>
-        <p:spPr>
-          <a:xfrm>
-            <a:off x="1466883" y="996462"/>
-            <a:ext cx="3444267" cy="2345443"/>
+            <a:off x="553971" y="1193655"/>
+            <a:ext cx="5975618" cy="2532918"/>
           </a:xfrm>
           <a:prstGeom prst="rect">
             <a:avLst/>
@@ -6219,45 +5120,376 @@
           </a:ln>
         </p:spPr>
       </p:pic>
-      <p:pic>
-        <p:nvPicPr>
-          <p:cNvPr id="17" name="그림 16">
+      <p:sp>
+        <p:nvSpPr>
+          <p:cNvPr id="5" name="TextBox 4">
             <a:extLst>
               <a:ext uri="{FF2B5EF4-FFF2-40B4-BE49-F238E27FC236}">
-                <a16:creationId xmlns:a16="http://schemas.microsoft.com/office/drawing/2014/main" id="{0C398B96-B1F8-0B40-9F31-30EA9AD8DDD4}"/>
+                <a16:creationId xmlns:a16="http://schemas.microsoft.com/office/drawing/2014/main" id="{33302256-BBC3-AC4A-9B5A-B83ED5BDB1F0}"/>
               </a:ext>
             </a:extLst>
           </p:cNvPr>
-          <p:cNvPicPr>
-            <a:picLocks noChangeAspect="1"/>
-          </p:cNvPicPr>
+          <p:cNvSpPr txBox="1"/>
           <p:nvPr/>
-        </p:nvPicPr>
-        <p:blipFill>
-          <a:blip r:embed="rId4"/>
-          <a:stretch>
-            <a:fillRect/>
-          </a:stretch>
-        </p:blipFill>
+        </p:nvSpPr>
         <p:spPr>
           <a:xfrm>
-            <a:off x="5244653" y="515460"/>
-            <a:ext cx="3690110" cy="3611356"/>
+            <a:off x="487707" y="3869048"/>
+            <a:ext cx="7340599" cy="2554545"/>
           </a:xfrm>
           <a:prstGeom prst="rect">
             <a:avLst/>
           </a:prstGeom>
-          <a:ln w="50800">
-            <a:solidFill>
-              <a:schemeClr val="accent4"/>
-            </a:solidFill>
-          </a:ln>
+          <a:noFill/>
         </p:spPr>
-      </p:pic>
+        <p:txBody>
+          <a:bodyPr wrap="square" rtlCol="0">
+            <a:spAutoFit/>
+          </a:bodyPr>
+          <a:lstStyle/>
+          <a:p>
+            <a:pPr marL="342900" indent="-342900">
+              <a:buFont typeface="+mj-lt"/>
+              <a:buAutoNum type="arabicPeriod"/>
+            </a:pPr>
+            <a:r>
+              <a:rPr kumimoji="1" lang="ko-KR" altLang="en-US" sz="1600" dirty="0"/>
+              <a:t>요청과 함께 해당 유저의 </a:t>
+            </a:r>
+            <a:r>
+              <a:rPr kumimoji="1" lang="en-US" altLang="ko-KR" sz="1600" dirty="0"/>
+              <a:t>id(</a:t>
+            </a:r>
+            <a:r>
+              <a:rPr kumimoji="1" lang="en-US" altLang="ko-KR" sz="1600" dirty="0" err="1"/>
+              <a:t>userID</a:t>
+            </a:r>
+            <a:r>
+              <a:rPr kumimoji="1" lang="en-US" altLang="ko-KR" sz="1600" dirty="0"/>
+              <a:t>)</a:t>
+            </a:r>
+            <a:r>
+              <a:rPr kumimoji="1" lang="ko-KR" altLang="en-US" sz="1600" dirty="0"/>
+              <a:t>와 화학약품의 이름</a:t>
+            </a:r>
+            <a:r>
+              <a:rPr kumimoji="1" lang="en-US" altLang="ko-KR" sz="1600" dirty="0"/>
+              <a:t>,</a:t>
+            </a:r>
+            <a:r>
+              <a:rPr kumimoji="1" lang="ko-KR" altLang="en-US" sz="1600" dirty="0"/>
+              <a:t> 화학약품이 보관될 장소를 받는다</a:t>
+            </a:r>
+            <a:r>
+              <a:rPr kumimoji="1" lang="en-US" altLang="ko-KR" sz="1600" dirty="0"/>
+              <a:t>.</a:t>
+            </a:r>
+            <a:r>
+              <a:rPr kumimoji="1" lang="ko-KR" altLang="en-US" sz="1600" dirty="0"/>
+              <a:t> 이 때</a:t>
+            </a:r>
+            <a:r>
+              <a:rPr kumimoji="1" lang="en-US" altLang="ko-KR" sz="1600" dirty="0"/>
+              <a:t>,</a:t>
+            </a:r>
+            <a:r>
+              <a:rPr kumimoji="1" lang="ko-KR" altLang="en-US" sz="1600" dirty="0"/>
+              <a:t> 화학약품의 이름은 </a:t>
+            </a:r>
+            <a:r>
+              <a:rPr kumimoji="1" lang="en-US" altLang="ko-KR" sz="1600" dirty="0"/>
+              <a:t>name</a:t>
+            </a:r>
+            <a:r>
+              <a:rPr kumimoji="1" lang="ko-KR" altLang="en-US" sz="1600" dirty="0"/>
+              <a:t>이라는 이름으로</a:t>
+            </a:r>
+            <a:r>
+              <a:rPr kumimoji="1" lang="en-US" altLang="ko-KR" sz="1600" dirty="0"/>
+              <a:t>,</a:t>
+            </a:r>
+            <a:r>
+              <a:rPr kumimoji="1" lang="ko-KR" altLang="en-US" sz="1600" dirty="0"/>
+              <a:t> 장소는 </a:t>
+            </a:r>
+            <a:r>
+              <a:rPr kumimoji="1" lang="en-US" altLang="ko-KR" sz="1600" dirty="0"/>
+              <a:t>place</a:t>
+            </a:r>
+            <a:r>
+              <a:rPr kumimoji="1" lang="ko-KR" altLang="en-US" sz="1600" dirty="0"/>
+              <a:t>란 이름으로 </a:t>
+            </a:r>
+            <a:r>
+              <a:rPr kumimoji="1" lang="en-US" altLang="ko-KR" sz="1600" dirty="0"/>
+              <a:t>Chemical </a:t>
+            </a:r>
+            <a:r>
+              <a:rPr kumimoji="1" lang="ko-KR" altLang="en-US" sz="1600" dirty="0"/>
+              <a:t>클래스의 인스턴스로 </a:t>
+            </a:r>
+            <a:r>
+              <a:rPr kumimoji="1" lang="ko-KR" altLang="en-US" sz="1600" dirty="0" err="1"/>
+              <a:t>매핑되어</a:t>
+            </a:r>
+            <a:r>
+              <a:rPr kumimoji="1" lang="ko-KR" altLang="en-US" sz="1600" dirty="0"/>
+              <a:t> 들어온다</a:t>
+            </a:r>
+            <a:r>
+              <a:rPr kumimoji="1" lang="en-US" altLang="ko-KR" sz="1600" dirty="0"/>
+              <a:t>.</a:t>
+            </a:r>
+            <a:r>
+              <a:rPr kumimoji="1" lang="ko-KR" altLang="en-US" sz="1600" dirty="0"/>
+              <a:t> </a:t>
+            </a:r>
+            <a:endParaRPr kumimoji="1" lang="en-US" altLang="ko-KR" sz="1600" dirty="0"/>
+          </a:p>
+          <a:p>
+            <a:pPr marL="342900" indent="-342900">
+              <a:buFont typeface="+mj-lt"/>
+              <a:buAutoNum type="arabicPeriod"/>
+            </a:pPr>
+            <a:r>
+              <a:rPr kumimoji="1" lang="en-US" altLang="ko-KR" sz="1600" dirty="0"/>
+              <a:t>Chemical</a:t>
+            </a:r>
+            <a:r>
+              <a:rPr kumimoji="1" lang="ko-KR" altLang="en-US" sz="1600" dirty="0"/>
+              <a:t> 클래스의 </a:t>
+            </a:r>
+            <a:r>
+              <a:rPr kumimoji="1" lang="en-US" altLang="ko-KR" sz="1600" dirty="0" err="1"/>
+              <a:t>setPresentTime</a:t>
+            </a:r>
+            <a:r>
+              <a:rPr kumimoji="1" lang="ko-KR" altLang="en-US" sz="1600" dirty="0"/>
+              <a:t> </a:t>
+            </a:r>
+            <a:r>
+              <a:rPr kumimoji="1" lang="ko-KR" altLang="en-US" sz="1600" dirty="0" err="1"/>
+              <a:t>메소드를</a:t>
+            </a:r>
+            <a:r>
+              <a:rPr kumimoji="1" lang="ko-KR" altLang="en-US" sz="1600" dirty="0"/>
+              <a:t> 통해 현재 시간을 등록해준다</a:t>
+            </a:r>
+            <a:r>
+              <a:rPr kumimoji="1" lang="en-US" altLang="ko-KR" sz="1600" dirty="0"/>
+              <a:t>.</a:t>
+            </a:r>
+            <a:r>
+              <a:rPr kumimoji="1" lang="ko-KR" altLang="en-US" sz="1600" dirty="0"/>
+              <a:t> </a:t>
+            </a:r>
+            <a:endParaRPr kumimoji="1" lang="en-US" altLang="ko-KR" sz="1600" dirty="0"/>
+          </a:p>
+          <a:p>
+            <a:pPr marL="342900" indent="-342900">
+              <a:buFont typeface="+mj-lt"/>
+              <a:buAutoNum type="arabicPeriod"/>
+            </a:pPr>
+            <a:r>
+              <a:rPr kumimoji="1" lang="en-US" altLang="ko-KR" sz="1600" dirty="0" err="1"/>
+              <a:t>chemicalRepository</a:t>
+            </a:r>
+            <a:r>
+              <a:rPr kumimoji="1" lang="ko-KR" altLang="en-US" sz="1600" dirty="0"/>
+              <a:t>의 </a:t>
+            </a:r>
+            <a:r>
+              <a:rPr kumimoji="1" lang="en-US" altLang="ko-KR" sz="1600" dirty="0"/>
+              <a:t>save</a:t>
+            </a:r>
+            <a:r>
+              <a:rPr kumimoji="1" lang="ko-KR" altLang="en-US" sz="1600" dirty="0"/>
+              <a:t> </a:t>
+            </a:r>
+            <a:r>
+              <a:rPr kumimoji="1" lang="ko-KR" altLang="en-US" sz="1600" dirty="0" err="1"/>
+              <a:t>메소드를</a:t>
+            </a:r>
+            <a:r>
+              <a:rPr kumimoji="1" lang="ko-KR" altLang="en-US" sz="1600" dirty="0"/>
+              <a:t> 통해 화학 약품을 등록 해 주고</a:t>
+            </a:r>
+            <a:r>
+              <a:rPr kumimoji="1" lang="en-US" altLang="ko-KR" sz="1600" dirty="0"/>
+              <a:t>,</a:t>
+            </a:r>
+            <a:r>
+              <a:rPr kumimoji="1" lang="ko-KR" altLang="en-US" sz="1600" dirty="0"/>
+              <a:t> </a:t>
+            </a:r>
+            <a:r>
+              <a:rPr kumimoji="1" lang="en-US" altLang="ko-KR" sz="1600" dirty="0"/>
+              <a:t>primary</a:t>
+            </a:r>
+            <a:r>
+              <a:rPr kumimoji="1" lang="ko-KR" altLang="en-US" sz="1600" dirty="0"/>
+              <a:t> </a:t>
+            </a:r>
+            <a:r>
+              <a:rPr kumimoji="1" lang="en-US" altLang="ko-KR" sz="1600" dirty="0"/>
+              <a:t>key(id)</a:t>
+            </a:r>
+            <a:r>
+              <a:rPr kumimoji="1" lang="ko-KR" altLang="en-US" sz="1600" dirty="0"/>
+              <a:t>가 포함된 </a:t>
+            </a:r>
+            <a:r>
+              <a:rPr kumimoji="1" lang="en-US" altLang="ko-KR" sz="1600" dirty="0" err="1"/>
+              <a:t>savedChemical</a:t>
+            </a:r>
+            <a:r>
+              <a:rPr kumimoji="1" lang="ko-KR" altLang="en-US" sz="1600" dirty="0"/>
+              <a:t>을 </a:t>
+            </a:r>
+            <a:r>
+              <a:rPr kumimoji="1" lang="ko-KR" altLang="en-US" sz="1600" dirty="0" err="1"/>
+              <a:t>리턴받는다</a:t>
+            </a:r>
+            <a:r>
+              <a:rPr kumimoji="1" lang="en-US" altLang="ko-KR" sz="1600" dirty="0"/>
+              <a:t>.</a:t>
+            </a:r>
+          </a:p>
+          <a:p>
+            <a:pPr marL="342900" indent="-342900">
+              <a:buFont typeface="+mj-lt"/>
+              <a:buAutoNum type="arabicPeriod"/>
+            </a:pPr>
+            <a:r>
+              <a:rPr kumimoji="1" lang="en-US" altLang="ko-KR" sz="1600" dirty="0" err="1"/>
+              <a:t>userRepository</a:t>
+            </a:r>
+            <a:r>
+              <a:rPr kumimoji="1" lang="ko-KR" altLang="en-US" sz="1600" dirty="0"/>
+              <a:t>의 </a:t>
+            </a:r>
+            <a:r>
+              <a:rPr kumimoji="1" lang="en-US" altLang="ko-KR" sz="1600" dirty="0" err="1"/>
+              <a:t>findByID</a:t>
+            </a:r>
+            <a:r>
+              <a:rPr kumimoji="1" lang="ko-KR" altLang="en-US" sz="1600" dirty="0"/>
+              <a:t> </a:t>
+            </a:r>
+            <a:r>
+              <a:rPr kumimoji="1" lang="ko-KR" altLang="en-US" sz="1600" dirty="0" err="1"/>
+              <a:t>메소드를</a:t>
+            </a:r>
+            <a:r>
+              <a:rPr kumimoji="1" lang="ko-KR" altLang="en-US" sz="1600" dirty="0"/>
+              <a:t> 통해 유저를 찾아주고</a:t>
+            </a:r>
+            <a:r>
+              <a:rPr kumimoji="1" lang="en-US" altLang="ko-KR" sz="1600" dirty="0"/>
+              <a:t>,</a:t>
+            </a:r>
+            <a:r>
+              <a:rPr kumimoji="1" lang="ko-KR" altLang="en-US" sz="1600" dirty="0"/>
+              <a:t> 해당 유저의 </a:t>
+            </a:r>
+            <a:r>
+              <a:rPr kumimoji="1" lang="en-US" altLang="ko-KR" sz="1600" dirty="0"/>
+              <a:t>chemicals</a:t>
+            </a:r>
+            <a:r>
+              <a:rPr kumimoji="1" lang="ko-KR" altLang="en-US" sz="1600" dirty="0"/>
+              <a:t>에 </a:t>
+            </a:r>
+            <a:r>
+              <a:rPr kumimoji="1" lang="en-US" altLang="ko-KR" sz="1600" dirty="0" err="1"/>
+              <a:t>savedChemical</a:t>
+            </a:r>
+            <a:r>
+              <a:rPr kumimoji="1" lang="ko-KR" altLang="en-US" sz="1600" dirty="0"/>
+              <a:t>을 추가 해 준다</a:t>
+            </a:r>
+            <a:r>
+              <a:rPr kumimoji="1" lang="en-US" altLang="ko-KR" sz="1600" dirty="0"/>
+              <a:t>.</a:t>
+            </a:r>
+            <a:r>
+              <a:rPr kumimoji="1" lang="ko-KR" altLang="en-US" sz="1600" dirty="0"/>
+              <a:t> </a:t>
+            </a:r>
+            <a:endParaRPr kumimoji="1" lang="en-US" altLang="ko-KR" sz="1600" dirty="0"/>
+          </a:p>
+          <a:p>
+            <a:pPr marL="342900" indent="-342900">
+              <a:buFont typeface="+mj-lt"/>
+              <a:buAutoNum type="arabicPeriod"/>
+            </a:pPr>
+            <a:r>
+              <a:rPr kumimoji="1" lang="en-US" altLang="ko-KR" sz="1600" dirty="0"/>
+              <a:t>user</a:t>
+            </a:r>
+            <a:r>
+              <a:rPr kumimoji="1" lang="ko-KR" altLang="en-US" sz="1600" dirty="0" err="1"/>
+              <a:t>를</a:t>
+            </a:r>
+            <a:r>
+              <a:rPr kumimoji="1" lang="ko-KR" altLang="en-US" sz="1600" dirty="0"/>
+              <a:t> 저장 해 주면</a:t>
+            </a:r>
+            <a:r>
+              <a:rPr kumimoji="1" lang="en-US" altLang="ko-KR" sz="1600" dirty="0"/>
+              <a:t>,</a:t>
+            </a:r>
+            <a:r>
+              <a:rPr kumimoji="1" lang="ko-KR" altLang="en-US" sz="1600" dirty="0"/>
+              <a:t> </a:t>
+            </a:r>
+            <a:r>
+              <a:rPr kumimoji="1" lang="en-US" altLang="ko-KR" sz="1600" dirty="0"/>
+              <a:t>user</a:t>
+            </a:r>
+            <a:r>
+              <a:rPr kumimoji="1" lang="ko-KR" altLang="en-US" sz="1600" dirty="0"/>
+              <a:t>와 </a:t>
+            </a:r>
+            <a:r>
+              <a:rPr kumimoji="1" lang="en-US" altLang="ko-KR" sz="1600" dirty="0"/>
+              <a:t>chemical</a:t>
+            </a:r>
+            <a:r>
+              <a:rPr kumimoji="1" lang="ko-KR" altLang="en-US" sz="1600" dirty="0"/>
+              <a:t> 간의 </a:t>
+            </a:r>
+            <a:r>
+              <a:rPr kumimoji="1" lang="en-US" altLang="ko-KR" sz="1600" dirty="0"/>
+              <a:t>relationship</a:t>
+            </a:r>
+            <a:r>
+              <a:rPr kumimoji="1" lang="ko-KR" altLang="en-US" sz="1600" dirty="0"/>
+              <a:t> 또한 저장 된다</a:t>
+            </a:r>
+            <a:r>
+              <a:rPr kumimoji="1" lang="en-US" altLang="ko-KR" sz="1600" dirty="0"/>
+              <a:t>.</a:t>
+            </a:r>
+            <a:r>
+              <a:rPr kumimoji="1" lang="ko-KR" altLang="en-US" sz="1600" dirty="0"/>
+              <a:t> </a:t>
+            </a:r>
+            <a:endParaRPr kumimoji="1" lang="en-US" altLang="ko-KR" sz="1600" dirty="0"/>
+          </a:p>
+          <a:p>
+            <a:pPr marL="342900" indent="-342900">
+              <a:buFont typeface="+mj-lt"/>
+              <a:buAutoNum type="arabicPeriod"/>
+            </a:pPr>
+            <a:endParaRPr kumimoji="1" lang="ko-KR" altLang="en-US" sz="1600" dirty="0"/>
+          </a:p>
+        </p:txBody>
+      </p:sp>
     </p:spTree>
     <p:extLst>
       <p:ext uri="{BB962C8B-B14F-4D97-AF65-F5344CB8AC3E}">
-        <p14:creationId xmlns:p14="http://schemas.microsoft.com/office/powerpoint/2010/main" val="2786310154"/>
+        <p14:creationId xmlns:p14="http://schemas.microsoft.com/office/powerpoint/2010/main" val="3553774336"/>
       </p:ext>
     </p:extLst>
   </p:cSld>

</xml_diff>